<commit_message>
color in code chunk for pdf
</commit_message>
<xml_diff>
--- a/images/survival-kit/init-shiny-recap.pptx
+++ b/images/survival-kit/init-shiny-recap.pptx
@@ -197,7 +197,7 @@
           <a:p>
             <a:fld id="{D3C91AF2-D911-2E49-A515-C1B4FD51DD3B}" type="datetimeFigureOut">
               <a:rPr lang="en-CH" smtClean="0"/>
-              <a:t>26.10.20</a:t>
+              <a:t>14.03.21</a:t>
             </a:fld>
             <a:endParaRPr lang="en-CH"/>
           </a:p>
@@ -680,7 +680,7 @@
           <a:p>
             <a:fld id="{D582C26B-9A71-0945-8231-47DC5EA78747}" type="datetimeFigureOut">
               <a:rPr lang="en-CH" smtClean="0"/>
-              <a:t>26.10.20</a:t>
+              <a:t>14.03.21</a:t>
             </a:fld>
             <a:endParaRPr lang="en-CH"/>
           </a:p>
@@ -850,7 +850,7 @@
           <a:p>
             <a:fld id="{D582C26B-9A71-0945-8231-47DC5EA78747}" type="datetimeFigureOut">
               <a:rPr lang="en-CH" smtClean="0"/>
-              <a:t>26.10.20</a:t>
+              <a:t>14.03.21</a:t>
             </a:fld>
             <a:endParaRPr lang="en-CH"/>
           </a:p>
@@ -1030,7 +1030,7 @@
           <a:p>
             <a:fld id="{D582C26B-9A71-0945-8231-47DC5EA78747}" type="datetimeFigureOut">
               <a:rPr lang="en-CH" smtClean="0"/>
-              <a:t>26.10.20</a:t>
+              <a:t>14.03.21</a:t>
             </a:fld>
             <a:endParaRPr lang="en-CH"/>
           </a:p>
@@ -1200,7 +1200,7 @@
           <a:p>
             <a:fld id="{D582C26B-9A71-0945-8231-47DC5EA78747}" type="datetimeFigureOut">
               <a:rPr lang="en-CH" smtClean="0"/>
-              <a:t>26.10.20</a:t>
+              <a:t>14.03.21</a:t>
             </a:fld>
             <a:endParaRPr lang="en-CH"/>
           </a:p>
@@ -1444,7 +1444,7 @@
           <a:p>
             <a:fld id="{D582C26B-9A71-0945-8231-47DC5EA78747}" type="datetimeFigureOut">
               <a:rPr lang="en-CH" smtClean="0"/>
-              <a:t>26.10.20</a:t>
+              <a:t>14.03.21</a:t>
             </a:fld>
             <a:endParaRPr lang="en-CH"/>
           </a:p>
@@ -1676,7 +1676,7 @@
           <a:p>
             <a:fld id="{D582C26B-9A71-0945-8231-47DC5EA78747}" type="datetimeFigureOut">
               <a:rPr lang="en-CH" smtClean="0"/>
-              <a:t>26.10.20</a:t>
+              <a:t>14.03.21</a:t>
             </a:fld>
             <a:endParaRPr lang="en-CH"/>
           </a:p>
@@ -2043,7 +2043,7 @@
           <a:p>
             <a:fld id="{D582C26B-9A71-0945-8231-47DC5EA78747}" type="datetimeFigureOut">
               <a:rPr lang="en-CH" smtClean="0"/>
-              <a:t>26.10.20</a:t>
+              <a:t>14.03.21</a:t>
             </a:fld>
             <a:endParaRPr lang="en-CH"/>
           </a:p>
@@ -2161,7 +2161,7 @@
           <a:p>
             <a:fld id="{D582C26B-9A71-0945-8231-47DC5EA78747}" type="datetimeFigureOut">
               <a:rPr lang="en-CH" smtClean="0"/>
-              <a:t>26.10.20</a:t>
+              <a:t>14.03.21</a:t>
             </a:fld>
             <a:endParaRPr lang="en-CH"/>
           </a:p>
@@ -2256,7 +2256,7 @@
           <a:p>
             <a:fld id="{D582C26B-9A71-0945-8231-47DC5EA78747}" type="datetimeFigureOut">
               <a:rPr lang="en-CH" smtClean="0"/>
-              <a:t>26.10.20</a:t>
+              <a:t>14.03.21</a:t>
             </a:fld>
             <a:endParaRPr lang="en-CH"/>
           </a:p>
@@ -2533,7 +2533,7 @@
           <a:p>
             <a:fld id="{D582C26B-9A71-0945-8231-47DC5EA78747}" type="datetimeFigureOut">
               <a:rPr lang="en-CH" smtClean="0"/>
-              <a:t>26.10.20</a:t>
+              <a:t>14.03.21</a:t>
             </a:fld>
             <a:endParaRPr lang="en-CH"/>
           </a:p>
@@ -2790,7 +2790,7 @@
           <a:p>
             <a:fld id="{D582C26B-9A71-0945-8231-47DC5EA78747}" type="datetimeFigureOut">
               <a:rPr lang="en-CH" smtClean="0"/>
-              <a:t>26.10.20</a:t>
+              <a:t>14.03.21</a:t>
             </a:fld>
             <a:endParaRPr lang="en-CH"/>
           </a:p>
@@ -3003,7 +3003,7 @@
           <a:p>
             <a:fld id="{D582C26B-9A71-0945-8231-47DC5EA78747}" type="datetimeFigureOut">
               <a:rPr lang="en-CH" smtClean="0"/>
-              <a:t>26.10.20</a:t>
+              <a:t>14.03.21</a:t>
             </a:fld>
             <a:endParaRPr lang="en-CH"/>
           </a:p>
@@ -3422,7 +3422,7 @@
         </p:nvSpPr>
         <p:spPr>
           <a:xfrm>
-            <a:off x="188615" y="105539"/>
+            <a:off x="735712" y="0"/>
             <a:ext cx="2004294" cy="400110"/>
           </a:xfrm>
           <a:prstGeom prst="rect">
@@ -3459,13 +3459,13 @@
         </p:nvCxnSpPr>
         <p:spPr>
           <a:xfrm>
-            <a:off x="875847" y="489394"/>
-            <a:ext cx="0" cy="384657"/>
+            <a:off x="1348287" y="1443184"/>
+            <a:ext cx="0" cy="1170943"/>
           </a:xfrm>
           <a:prstGeom prst="straightConnector1">
             <a:avLst/>
           </a:prstGeom>
-          <a:ln>
+          <a:ln w="38100">
             <a:solidFill>
               <a:schemeClr val="tx1"/>
             </a:solidFill>
@@ -3501,7 +3501,7 @@
         </p:nvSpPr>
         <p:spPr>
           <a:xfrm>
-            <a:off x="98273" y="1410874"/>
+            <a:off x="653759" y="1012102"/>
             <a:ext cx="2390805" cy="400110"/>
           </a:xfrm>
           <a:prstGeom prst="rect">
@@ -3522,50 +3522,6 @@
           </a:p>
         </p:txBody>
       </p:sp>
-      <p:cxnSp>
-        <p:nvCxnSpPr>
-          <p:cNvPr id="8" name="Straight Arrow Connector 7">
-            <a:extLst>
-              <a:ext uri="{FF2B5EF4-FFF2-40B4-BE49-F238E27FC236}">
-                <a16:creationId xmlns:a16="http://schemas.microsoft.com/office/drawing/2014/main" id="{B5634003-E7CE-3242-9434-603837254074}"/>
-              </a:ext>
-            </a:extLst>
-          </p:cNvPr>
-          <p:cNvCxnSpPr>
-            <a:cxnSpLocks/>
-          </p:cNvCxnSpPr>
-          <p:nvPr/>
-        </p:nvCxnSpPr>
-        <p:spPr>
-          <a:xfrm>
-            <a:off x="921376" y="2151518"/>
-            <a:ext cx="0" cy="458870"/>
-          </a:xfrm>
-          <a:prstGeom prst="straightConnector1">
-            <a:avLst/>
-          </a:prstGeom>
-          <a:ln>
-            <a:solidFill>
-              <a:schemeClr val="tx1"/>
-            </a:solidFill>
-            <a:tailEnd type="triangle"/>
-          </a:ln>
-        </p:spPr>
-        <p:style>
-          <a:lnRef idx="1">
-            <a:schemeClr val="accent1"/>
-          </a:lnRef>
-          <a:fillRef idx="0">
-            <a:schemeClr val="accent1"/>
-          </a:fillRef>
-          <a:effectRef idx="0">
-            <a:schemeClr val="accent1"/>
-          </a:effectRef>
-          <a:fontRef idx="minor">
-            <a:schemeClr val="tx1"/>
-          </a:fontRef>
-        </p:style>
-      </p:cxnSp>
       <p:sp>
         <p:nvSpPr>
           <p:cNvPr id="9" name="Rectangle 8">
@@ -3580,7 +3536,7 @@
         </p:nvSpPr>
         <p:spPr>
           <a:xfrm>
-            <a:off x="2492620" y="1626081"/>
+            <a:off x="2997436" y="1553367"/>
             <a:ext cx="1405722" cy="1060760"/>
           </a:xfrm>
           <a:prstGeom prst="rect">
@@ -3632,7 +3588,7 @@
         </p:nvSpPr>
         <p:spPr>
           <a:xfrm>
-            <a:off x="2397086" y="1205280"/>
+            <a:off x="2901902" y="1132566"/>
             <a:ext cx="2065183" cy="369332"/>
           </a:xfrm>
           <a:prstGeom prst="rect">
@@ -3667,7 +3623,7 @@
         </p:nvSpPr>
         <p:spPr>
           <a:xfrm>
-            <a:off x="2551585" y="1707965"/>
+            <a:off x="3056401" y="1635251"/>
             <a:ext cx="846161" cy="341194"/>
           </a:xfrm>
           <a:prstGeom prst="rect">
@@ -3721,7 +3677,7 @@
         </p:nvSpPr>
         <p:spPr>
           <a:xfrm>
-            <a:off x="2703985" y="1860365"/>
+            <a:off x="3208801" y="1787651"/>
             <a:ext cx="846161" cy="341194"/>
           </a:xfrm>
           <a:prstGeom prst="rect">
@@ -3775,7 +3731,7 @@
         </p:nvSpPr>
         <p:spPr>
           <a:xfrm>
-            <a:off x="2856385" y="2012765"/>
+            <a:off x="3361201" y="1940051"/>
             <a:ext cx="846161" cy="341194"/>
           </a:xfrm>
           <a:prstGeom prst="rect">
@@ -3829,7 +3785,7 @@
         </p:nvSpPr>
         <p:spPr>
           <a:xfrm>
-            <a:off x="3008785" y="2151518"/>
+            <a:off x="3513601" y="2078804"/>
             <a:ext cx="846161" cy="341194"/>
           </a:xfrm>
           <a:prstGeom prst="rect">
@@ -3883,7 +3839,7 @@
         </p:nvSpPr>
         <p:spPr>
           <a:xfrm>
-            <a:off x="204005" y="2646664"/>
+            <a:off x="718911" y="2586629"/>
             <a:ext cx="2390805" cy="400110"/>
           </a:xfrm>
           <a:prstGeom prst="rect">
@@ -3918,7 +3874,7 @@
         </p:nvSpPr>
         <p:spPr>
           <a:xfrm>
-            <a:off x="2703939" y="3940516"/>
+            <a:off x="5015082" y="6500796"/>
             <a:ext cx="2065183" cy="369332"/>
           </a:xfrm>
           <a:prstGeom prst="rect">
@@ -3941,27 +3897,287 @@
       </p:sp>
       <p:cxnSp>
         <p:nvCxnSpPr>
-          <p:cNvPr id="17" name="Straight Arrow Connector 16">
+          <p:cNvPr id="20" name="Curved Connector 19">
             <a:extLst>
               <a:ext uri="{FF2B5EF4-FFF2-40B4-BE49-F238E27FC236}">
-                <a16:creationId xmlns:a16="http://schemas.microsoft.com/office/drawing/2014/main" id="{EE846256-53BD-D84E-89D5-135E94A8DA5A}"/>
+                <a16:creationId xmlns:a16="http://schemas.microsoft.com/office/drawing/2014/main" id="{AE65FB14-2D66-254D-B1B1-9BBC0AC3B510}"/>
               </a:ext>
             </a:extLst>
           </p:cNvPr>
           <p:cNvCxnSpPr>
             <a:cxnSpLocks/>
+            <a:stCxn id="9" idx="2"/>
+            <a:endCxn id="21" idx="0"/>
           </p:cNvCxnSpPr>
           <p:nvPr/>
         </p:nvCxnSpPr>
         <p:spPr>
-          <a:xfrm>
-            <a:off x="921376" y="3071498"/>
-            <a:ext cx="0" cy="613404"/>
-          </a:xfrm>
-          <a:prstGeom prst="straightConnector1">
-            <a:avLst/>
-          </a:prstGeom>
-          <a:ln>
+          <a:xfrm rot="5400000">
+            <a:off x="1635264" y="1653740"/>
+            <a:ext cx="1104646" cy="3025421"/>
+          </a:xfrm>
+          <a:prstGeom prst="curvedConnector3">
+            <a:avLst>
+              <a:gd name="adj1" fmla="val 50000"/>
+            </a:avLst>
+          </a:prstGeom>
+          <a:ln w="38100">
+            <a:solidFill>
+              <a:schemeClr val="tx1"/>
+            </a:solidFill>
+            <a:tailEnd type="triangle"/>
+          </a:ln>
+        </p:spPr>
+        <p:style>
+          <a:lnRef idx="1">
+            <a:schemeClr val="accent1"/>
+          </a:lnRef>
+          <a:fillRef idx="0">
+            <a:schemeClr val="accent1"/>
+          </a:fillRef>
+          <a:effectRef idx="0">
+            <a:schemeClr val="accent1"/>
+          </a:effectRef>
+          <a:fontRef idx="minor">
+            <a:schemeClr val="tx1"/>
+          </a:fontRef>
+        </p:style>
+      </p:cxnSp>
+      <p:sp>
+        <p:nvSpPr>
+          <p:cNvPr id="22" name="TextBox 21">
+            <a:extLst>
+              <a:ext uri="{FF2B5EF4-FFF2-40B4-BE49-F238E27FC236}">
+                <a16:creationId xmlns:a16="http://schemas.microsoft.com/office/drawing/2014/main" id="{7C4D20CE-9DBA-9741-A80C-69D83A6C502F}"/>
+              </a:ext>
+            </a:extLst>
+          </p:cNvPr>
+          <p:cNvSpPr txBox="1"/>
+          <p:nvPr/>
+        </p:nvSpPr>
+        <p:spPr>
+          <a:xfrm>
+            <a:off x="3514606" y="2857227"/>
+            <a:ext cx="1563022" cy="369332"/>
+          </a:xfrm>
+          <a:prstGeom prst="rect">
+            <a:avLst/>
+          </a:prstGeom>
+          <a:noFill/>
+        </p:spPr>
+        <p:txBody>
+          <a:bodyPr wrap="square" rtlCol="0">
+            <a:spAutoFit/>
+          </a:bodyPr>
+          <a:lstStyle/>
+          <a:p>
+            <a:r>
+              <a:rPr lang="en-CH" i="1" dirty="0"/>
+              <a:t>getBindings()</a:t>
+            </a:r>
+          </a:p>
+        </p:txBody>
+      </p:sp>
+      <p:sp>
+        <p:nvSpPr>
+          <p:cNvPr id="23" name="Rectangle 22">
+            <a:extLst>
+              <a:ext uri="{FF2B5EF4-FFF2-40B4-BE49-F238E27FC236}">
+                <a16:creationId xmlns:a16="http://schemas.microsoft.com/office/drawing/2014/main" id="{82D760E9-92D1-2043-BBDC-7B84AF53C8EE}"/>
+              </a:ext>
+            </a:extLst>
+          </p:cNvPr>
+          <p:cNvSpPr/>
+          <p:nvPr/>
+        </p:nvSpPr>
+        <p:spPr>
+          <a:xfrm>
+            <a:off x="110711" y="3399361"/>
+            <a:ext cx="6636577" cy="1636597"/>
+          </a:xfrm>
+          <a:prstGeom prst="rect">
+            <a:avLst/>
+          </a:prstGeom>
+          <a:noFill/>
+          <a:ln w="38100">
+            <a:solidFill>
+              <a:schemeClr val="tx1"/>
+            </a:solidFill>
+          </a:ln>
+        </p:spPr>
+        <p:style>
+          <a:lnRef idx="2">
+            <a:schemeClr val="accent1">
+              <a:shade val="50000"/>
+            </a:schemeClr>
+          </a:lnRef>
+          <a:fillRef idx="1">
+            <a:schemeClr val="accent1"/>
+          </a:fillRef>
+          <a:effectRef idx="0">
+            <a:schemeClr val="accent1"/>
+          </a:effectRef>
+          <a:fontRef idx="minor">
+            <a:schemeClr val="lt1"/>
+          </a:fontRef>
+        </p:style>
+        <p:txBody>
+          <a:bodyPr rtlCol="0" anchor="ctr"/>
+          <a:lstStyle/>
+          <a:p>
+            <a:pPr algn="ctr"/>
+            <a:endParaRPr lang="en-CH"/>
+          </a:p>
+        </p:txBody>
+      </p:sp>
+      <p:sp>
+        <p:nvSpPr>
+          <p:cNvPr id="24" name="Rectangle 23">
+            <a:extLst>
+              <a:ext uri="{FF2B5EF4-FFF2-40B4-BE49-F238E27FC236}">
+                <a16:creationId xmlns:a16="http://schemas.microsoft.com/office/drawing/2014/main" id="{A012AFF8-ACE7-FA49-9B68-A440DCF02FA1}"/>
+              </a:ext>
+            </a:extLst>
+          </p:cNvPr>
+          <p:cNvSpPr/>
+          <p:nvPr/>
+        </p:nvSpPr>
+        <p:spPr>
+          <a:xfrm>
+            <a:off x="5340395" y="5440036"/>
+            <a:ext cx="1223841" cy="1060760"/>
+          </a:xfrm>
+          <a:prstGeom prst="rect">
+            <a:avLst/>
+          </a:prstGeom>
+          <a:noFill/>
+          <a:ln w="38100">
+            <a:solidFill>
+              <a:schemeClr val="tx1"/>
+            </a:solidFill>
+          </a:ln>
+        </p:spPr>
+        <p:style>
+          <a:lnRef idx="2">
+            <a:schemeClr val="accent1">
+              <a:shade val="50000"/>
+            </a:schemeClr>
+          </a:lnRef>
+          <a:fillRef idx="1">
+            <a:schemeClr val="accent1"/>
+          </a:fillRef>
+          <a:effectRef idx="0">
+            <a:schemeClr val="accent1"/>
+          </a:effectRef>
+          <a:fontRef idx="minor">
+            <a:schemeClr val="lt1"/>
+          </a:fontRef>
+        </p:style>
+        <p:txBody>
+          <a:bodyPr rtlCol="0" anchor="ctr"/>
+          <a:lstStyle/>
+          <a:p>
+            <a:pPr algn="ctr"/>
+            <a:endParaRPr lang="en-CH"/>
+          </a:p>
+        </p:txBody>
+      </p:sp>
+      <p:sp>
+        <p:nvSpPr>
+          <p:cNvPr id="39" name="TextBox 38">
+            <a:extLst>
+              <a:ext uri="{FF2B5EF4-FFF2-40B4-BE49-F238E27FC236}">
+                <a16:creationId xmlns:a16="http://schemas.microsoft.com/office/drawing/2014/main" id="{97A49D15-3BAD-9042-9472-233F389A2CB4}"/>
+              </a:ext>
+            </a:extLst>
+          </p:cNvPr>
+          <p:cNvSpPr txBox="1"/>
+          <p:nvPr/>
+        </p:nvSpPr>
+        <p:spPr>
+          <a:xfrm>
+            <a:off x="2611091" y="3734147"/>
+            <a:ext cx="1529046" cy="1200329"/>
+          </a:xfrm>
+          <a:prstGeom prst="rect">
+            <a:avLst/>
+          </a:prstGeom>
+          <a:noFill/>
+        </p:spPr>
+        <p:txBody>
+          <a:bodyPr wrap="square" rtlCol="0">
+            <a:spAutoFit/>
+          </a:bodyPr>
+          <a:lstStyle/>
+          <a:p>
+            <a:pPr marL="285750" indent="-285750">
+              <a:buFont typeface="Arial" panose="020B0604020202020204" pitchFamily="34" charset="0"/>
+              <a:buChar char="•"/>
+            </a:pPr>
+            <a:r>
+              <a:rPr lang="en-CH" b="1" dirty="0"/>
+              <a:t>getId</a:t>
+            </a:r>
+          </a:p>
+          <a:p>
+            <a:pPr marL="285750" indent="-285750">
+              <a:buFont typeface="Arial" panose="020B0604020202020204" pitchFamily="34" charset="0"/>
+              <a:buChar char="•"/>
+            </a:pPr>
+            <a:r>
+              <a:rPr lang="en-CH" b="1" dirty="0"/>
+              <a:t>getType</a:t>
+            </a:r>
+          </a:p>
+          <a:p>
+            <a:pPr marL="285750" indent="-285750">
+              <a:buFont typeface="Arial" panose="020B0604020202020204" pitchFamily="34" charset="0"/>
+              <a:buChar char="•"/>
+            </a:pPr>
+            <a:r>
+              <a:rPr lang="en-CH" b="1" dirty="0"/>
+              <a:t>getValue</a:t>
+            </a:r>
+          </a:p>
+          <a:p>
+            <a:pPr marL="285750" indent="-285750">
+              <a:buFont typeface="Arial" panose="020B0604020202020204" pitchFamily="34" charset="0"/>
+              <a:buChar char="•"/>
+            </a:pPr>
+            <a:r>
+              <a:rPr lang="en-CH" b="1" dirty="0"/>
+              <a:t>subscribe</a:t>
+            </a:r>
+          </a:p>
+        </p:txBody>
+      </p:sp>
+      <p:cxnSp>
+        <p:nvCxnSpPr>
+          <p:cNvPr id="45" name="Curved Connector 44">
+            <a:extLst>
+              <a:ext uri="{FF2B5EF4-FFF2-40B4-BE49-F238E27FC236}">
+                <a16:creationId xmlns:a16="http://schemas.microsoft.com/office/drawing/2014/main" id="{D2984FF1-36BB-8F43-A795-37DB1C133910}"/>
+              </a:ext>
+            </a:extLst>
+          </p:cNvPr>
+          <p:cNvCxnSpPr>
+            <a:cxnSpLocks/>
+            <a:stCxn id="23" idx="2"/>
+            <a:endCxn id="24" idx="0"/>
+          </p:cNvCxnSpPr>
+          <p:nvPr/>
+        </p:nvCxnSpPr>
+        <p:spPr>
+          <a:xfrm rot="16200000" flipH="1">
+            <a:off x="4488619" y="3976339"/>
+            <a:ext cx="404078" cy="2523316"/>
+          </a:xfrm>
+          <a:prstGeom prst="curvedConnector3">
+            <a:avLst>
+              <a:gd name="adj1" fmla="val 50000"/>
+            </a:avLst>
+          </a:prstGeom>
+          <a:ln w="38100">
             <a:solidFill>
               <a:schemeClr val="tx1"/>
             </a:solidFill>
@@ -3985,28 +4201,27 @@
       </p:cxnSp>
       <p:cxnSp>
         <p:nvCxnSpPr>
-          <p:cNvPr id="20" name="Curved Connector 19">
+          <p:cNvPr id="51" name="Straight Arrow Connector 50">
             <a:extLst>
               <a:ext uri="{FF2B5EF4-FFF2-40B4-BE49-F238E27FC236}">
-                <a16:creationId xmlns:a16="http://schemas.microsoft.com/office/drawing/2014/main" id="{AE65FB14-2D66-254D-B1B1-9BBC0AC3B510}"/>
+                <a16:creationId xmlns:a16="http://schemas.microsoft.com/office/drawing/2014/main" id="{0D9864C2-484E-ED47-95E4-8B3BDE0474FB}"/>
               </a:ext>
             </a:extLst>
           </p:cNvPr>
           <p:cNvCxnSpPr>
             <a:cxnSpLocks/>
-            <a:stCxn id="9" idx="2"/>
           </p:cNvCxnSpPr>
           <p:nvPr/>
         </p:nvCxnSpPr>
         <p:spPr>
-          <a:xfrm rot="5400000">
-            <a:off x="2006510" y="2673188"/>
-            <a:ext cx="1175318" cy="1202625"/>
-          </a:xfrm>
-          <a:prstGeom prst="curvedConnector2">
-            <a:avLst/>
-          </a:prstGeom>
-          <a:ln>
+          <a:xfrm>
+            <a:off x="1341120" y="346041"/>
+            <a:ext cx="0" cy="607892"/>
+          </a:xfrm>
+          <a:prstGeom prst="straightConnector1">
+            <a:avLst/>
+          </a:prstGeom>
+          <a:ln w="38100">
             <a:solidFill>
               <a:schemeClr val="tx1"/>
             </a:solidFill>
@@ -4030,10 +4245,10 @@
       </p:cxnSp>
       <p:sp>
         <p:nvSpPr>
-          <p:cNvPr id="22" name="TextBox 21">
+          <p:cNvPr id="58" name="TextBox 57">
             <a:extLst>
               <a:ext uri="{FF2B5EF4-FFF2-40B4-BE49-F238E27FC236}">
-                <a16:creationId xmlns:a16="http://schemas.microsoft.com/office/drawing/2014/main" id="{7C4D20CE-9DBA-9741-A80C-69D83A6C502F}"/>
+                <a16:creationId xmlns:a16="http://schemas.microsoft.com/office/drawing/2014/main" id="{BF205F3D-38AC-1D45-BCBB-217A7490465B}"/>
               </a:ext>
             </a:extLst>
           </p:cNvPr>
@@ -4042,7 +4257,7 @@
         </p:nvSpPr>
         <p:spPr>
           <a:xfrm>
-            <a:off x="2955019" y="3325193"/>
+            <a:off x="3804051" y="570989"/>
             <a:ext cx="1563022" cy="369332"/>
           </a:xfrm>
           <a:prstGeom prst="rect">
@@ -4057,18 +4272,145 @@
           <a:lstStyle/>
           <a:p>
             <a:r>
-              <a:rPr lang="en-CH" b="1" dirty="0"/>
-              <a:t>getBindings()</a:t>
-            </a:r>
-          </a:p>
-        </p:txBody>
-      </p:sp>
-      <p:sp>
-        <p:nvSpPr>
-          <p:cNvPr id="23" name="Rectangle 22">
+              <a:rPr lang="en-CH" i="1" dirty="0"/>
+              <a:t>getBindings</a:t>
+            </a:r>
+            <a:r>
+              <a:rPr lang="en-CH" dirty="0"/>
+              <a:t>()</a:t>
+            </a:r>
+          </a:p>
+        </p:txBody>
+      </p:sp>
+      <p:cxnSp>
+        <p:nvCxnSpPr>
+          <p:cNvPr id="59" name="Straight Arrow Connector 58">
             <a:extLst>
               <a:ext uri="{FF2B5EF4-FFF2-40B4-BE49-F238E27FC236}">
-                <a16:creationId xmlns:a16="http://schemas.microsoft.com/office/drawing/2014/main" id="{82D760E9-92D1-2043-BBDC-7B84AF53C8EE}"/>
+                <a16:creationId xmlns:a16="http://schemas.microsoft.com/office/drawing/2014/main" id="{7D7F79D1-0572-954C-BBC2-B0E76787D0DF}"/>
+              </a:ext>
+            </a:extLst>
+          </p:cNvPr>
+          <p:cNvCxnSpPr>
+            <a:cxnSpLocks/>
+          </p:cNvCxnSpPr>
+          <p:nvPr/>
+        </p:nvCxnSpPr>
+        <p:spPr>
+          <a:xfrm>
+            <a:off x="2056141" y="200055"/>
+            <a:ext cx="490961" cy="0"/>
+          </a:xfrm>
+          <a:prstGeom prst="straightConnector1">
+            <a:avLst/>
+          </a:prstGeom>
+          <a:ln w="38100">
+            <a:solidFill>
+              <a:schemeClr val="tx1"/>
+            </a:solidFill>
+            <a:tailEnd type="triangle"/>
+          </a:ln>
+        </p:spPr>
+        <p:style>
+          <a:lnRef idx="1">
+            <a:schemeClr val="accent1"/>
+          </a:lnRef>
+          <a:fillRef idx="0">
+            <a:schemeClr val="accent1"/>
+          </a:fillRef>
+          <a:effectRef idx="0">
+            <a:schemeClr val="accent1"/>
+          </a:effectRef>
+          <a:fontRef idx="minor">
+            <a:schemeClr val="tx1"/>
+          </a:fontRef>
+        </p:style>
+      </p:cxnSp>
+      <p:sp>
+        <p:nvSpPr>
+          <p:cNvPr id="60" name="TextBox 59">
+            <a:extLst>
+              <a:ext uri="{FF2B5EF4-FFF2-40B4-BE49-F238E27FC236}">
+                <a16:creationId xmlns:a16="http://schemas.microsoft.com/office/drawing/2014/main" id="{074C6C6C-C43D-9B4E-B0BE-ED1B1C6F3FEE}"/>
+              </a:ext>
+            </a:extLst>
+          </p:cNvPr>
+          <p:cNvSpPr txBox="1"/>
+          <p:nvPr/>
+        </p:nvSpPr>
+        <p:spPr>
+          <a:xfrm>
+            <a:off x="2646356" y="0"/>
+            <a:ext cx="1884544" cy="369332"/>
+          </a:xfrm>
+          <a:prstGeom prst="rect">
+            <a:avLst/>
+          </a:prstGeom>
+          <a:noFill/>
+        </p:spPr>
+        <p:txBody>
+          <a:bodyPr wrap="square" rtlCol="0">
+            <a:spAutoFit/>
+          </a:bodyPr>
+          <a:lstStyle/>
+          <a:p>
+            <a:r>
+              <a:rPr lang="de-CH" dirty="0"/>
+              <a:t>Trigger </a:t>
+            </a:r>
+            <a:r>
+              <a:rPr lang="de-CH" b="1" dirty="0" err="1"/>
+              <a:t>initialize</a:t>
+            </a:r>
+            <a:endParaRPr lang="en-CH" b="1" dirty="0"/>
+          </a:p>
+        </p:txBody>
+      </p:sp>
+      <p:sp>
+        <p:nvSpPr>
+          <p:cNvPr id="61" name="TextBox 60">
+            <a:extLst>
+              <a:ext uri="{FF2B5EF4-FFF2-40B4-BE49-F238E27FC236}">
+                <a16:creationId xmlns:a16="http://schemas.microsoft.com/office/drawing/2014/main" id="{C5672F53-E019-1443-A99F-8750F23DE51D}"/>
+              </a:ext>
+            </a:extLst>
+          </p:cNvPr>
+          <p:cNvSpPr txBox="1"/>
+          <p:nvPr/>
+        </p:nvSpPr>
+        <p:spPr>
+          <a:xfrm>
+            <a:off x="4469946" y="1635251"/>
+            <a:ext cx="991249" cy="646331"/>
+          </a:xfrm>
+          <a:prstGeom prst="rect">
+            <a:avLst/>
+          </a:prstGeom>
+          <a:noFill/>
+        </p:spPr>
+        <p:txBody>
+          <a:bodyPr wrap="square" rtlCol="0">
+            <a:spAutoFit/>
+          </a:bodyPr>
+          <a:lstStyle/>
+          <a:p>
+            <a:r>
+              <a:rPr lang="en-GB" dirty="0"/>
+              <a:t>B</a:t>
+            </a:r>
+            <a:r>
+              <a:rPr lang="en-CH" dirty="0"/>
+              <a:t>indings registry</a:t>
+            </a:r>
+          </a:p>
+        </p:txBody>
+      </p:sp>
+      <p:sp>
+        <p:nvSpPr>
+          <p:cNvPr id="62" name="Rectangle 61">
+            <a:extLst>
+              <a:ext uri="{FF2B5EF4-FFF2-40B4-BE49-F238E27FC236}">
+                <a16:creationId xmlns:a16="http://schemas.microsoft.com/office/drawing/2014/main" id="{A028C3D3-9A6F-FD48-8A65-8C31480CD7E1}"/>
               </a:ext>
             </a:extLst>
           </p:cNvPr>
@@ -4077,17 +4419,19 @@
         </p:nvSpPr>
         <p:spPr>
           <a:xfrm>
-            <a:off x="0" y="3691102"/>
-            <a:ext cx="2614155" cy="5445792"/>
+            <a:off x="5456224" y="5580839"/>
+            <a:ext cx="846161" cy="341194"/>
           </a:xfrm>
           <a:prstGeom prst="rect">
             <a:avLst/>
           </a:prstGeom>
-          <a:noFill/>
-          <a:ln w="38100">
-            <a:solidFill>
-              <a:schemeClr val="tx1"/>
-            </a:solidFill>
+          <a:solidFill>
+            <a:schemeClr val="tx1">
+              <a:alpha val="56000"/>
+            </a:schemeClr>
+          </a:solidFill>
+          <a:ln>
+            <a:noFill/>
           </a:ln>
         </p:spPr>
         <p:style>
@@ -4115,131 +4459,107 @@
           </a:p>
         </p:txBody>
       </p:sp>
-      <p:sp>
-        <p:nvSpPr>
-          <p:cNvPr id="24" name="Rectangle 23">
+      <p:grpSp>
+        <p:nvGrpSpPr>
+          <p:cNvPr id="111" name="Group 110">
             <a:extLst>
               <a:ext uri="{FF2B5EF4-FFF2-40B4-BE49-F238E27FC236}">
-                <a16:creationId xmlns:a16="http://schemas.microsoft.com/office/drawing/2014/main" id="{A012AFF8-ACE7-FA49-9B68-A440DCF02FA1}"/>
+                <a16:creationId xmlns:a16="http://schemas.microsoft.com/office/drawing/2014/main" id="{DFEAF5EC-5678-574E-A0D9-B3850C49409E}"/>
               </a:ext>
             </a:extLst>
           </p:cNvPr>
-          <p:cNvSpPr/>
+          <p:cNvGrpSpPr/>
           <p:nvPr/>
-        </p:nvSpPr>
-        <p:spPr>
-          <a:xfrm>
-            <a:off x="2813160" y="4406402"/>
-            <a:ext cx="1405722" cy="1060760"/>
-          </a:xfrm>
-          <a:prstGeom prst="rect">
-            <a:avLst/>
-          </a:prstGeom>
-          <a:noFill/>
-          <a:ln w="38100">
-            <a:solidFill>
-              <a:schemeClr val="tx1"/>
-            </a:solidFill>
-          </a:ln>
-        </p:spPr>
-        <p:style>
-          <a:lnRef idx="2">
-            <a:schemeClr val="accent1">
-              <a:shade val="50000"/>
-            </a:schemeClr>
-          </a:lnRef>
-          <a:fillRef idx="1">
-            <a:schemeClr val="accent1"/>
-          </a:fillRef>
-          <a:effectRef idx="0">
-            <a:schemeClr val="accent1"/>
-          </a:effectRef>
-          <a:fontRef idx="minor">
-            <a:schemeClr val="lt1"/>
-          </a:fontRef>
-        </p:style>
-        <p:txBody>
-          <a:bodyPr rtlCol="0" anchor="ctr"/>
-          <a:lstStyle/>
-          <a:p>
-            <a:pPr algn="ctr"/>
-            <a:endParaRPr lang="en-CH"/>
-          </a:p>
-        </p:txBody>
-      </p:sp>
-      <p:sp>
-        <p:nvSpPr>
-          <p:cNvPr id="25" name="TextBox 24">
+        </p:nvGrpSpPr>
+        <p:grpSpPr>
+          <a:xfrm>
+            <a:off x="2226308" y="5770316"/>
+            <a:ext cx="3033482" cy="376797"/>
+            <a:chOff x="2226308" y="5770316"/>
+            <a:chExt cx="3033482" cy="376797"/>
+          </a:xfrm>
+        </p:grpSpPr>
+        <p:sp>
+          <p:nvSpPr>
+            <p:cNvPr id="66" name="TextBox 65">
+              <a:extLst>
+                <a:ext uri="{FF2B5EF4-FFF2-40B4-BE49-F238E27FC236}">
+                  <a16:creationId xmlns:a16="http://schemas.microsoft.com/office/drawing/2014/main" id="{01F80229-B999-6842-B8A0-23A9C28CB972}"/>
+                </a:ext>
+              </a:extLst>
+            </p:cNvPr>
+            <p:cNvSpPr txBox="1"/>
+            <p:nvPr/>
+          </p:nvSpPr>
+          <p:spPr>
+            <a:xfrm>
+              <a:off x="3478609" y="5777781"/>
+              <a:ext cx="1781181" cy="369332"/>
+            </a:xfrm>
+            <a:prstGeom prst="rect">
+              <a:avLst/>
+            </a:prstGeom>
+            <a:noFill/>
+          </p:spPr>
+          <p:txBody>
+            <a:bodyPr wrap="square" rtlCol="0">
+              <a:spAutoFit/>
+            </a:bodyPr>
+            <a:lstStyle/>
+            <a:p>
+              <a:r>
+                <a:rPr lang="en-CH" dirty="0"/>
+                <a:t>initialValues</a:t>
+              </a:r>
+            </a:p>
+          </p:txBody>
+        </p:sp>
+        <p:sp>
+          <p:nvSpPr>
+            <p:cNvPr id="69" name="TextBox 68">
+              <a:extLst>
+                <a:ext uri="{FF2B5EF4-FFF2-40B4-BE49-F238E27FC236}">
+                  <a16:creationId xmlns:a16="http://schemas.microsoft.com/office/drawing/2014/main" id="{4E43D6E2-71A4-714B-AF96-140A51D76996}"/>
+                </a:ext>
+              </a:extLst>
+            </p:cNvPr>
+            <p:cNvSpPr txBox="1"/>
+            <p:nvPr/>
+          </p:nvSpPr>
+          <p:spPr>
+            <a:xfrm>
+              <a:off x="2226308" y="5770316"/>
+              <a:ext cx="1781181" cy="369332"/>
+            </a:xfrm>
+            <a:prstGeom prst="rect">
+              <a:avLst/>
+            </a:prstGeom>
+            <a:noFill/>
+          </p:spPr>
+          <p:txBody>
+            <a:bodyPr wrap="square" rtlCol="0">
+              <a:spAutoFit/>
+            </a:bodyPr>
+            <a:lstStyle/>
+            <a:p>
+              <a:r>
+                <a:rPr lang="en-GB" dirty="0"/>
+                <a:t>C</a:t>
+              </a:r>
+              <a:r>
+                <a:rPr lang="en-CH" dirty="0"/>
+                <a:t>lient data +</a:t>
+              </a:r>
+            </a:p>
+          </p:txBody>
+        </p:sp>
+      </p:grpSp>
+      <p:cxnSp>
+        <p:nvCxnSpPr>
+          <p:cNvPr id="70" name="Straight Arrow Connector 69">
             <a:extLst>
               <a:ext uri="{FF2B5EF4-FFF2-40B4-BE49-F238E27FC236}">
-                <a16:creationId xmlns:a16="http://schemas.microsoft.com/office/drawing/2014/main" id="{72F31E39-7978-C54A-A115-B422494B03C0}"/>
-              </a:ext>
-            </a:extLst>
-          </p:cNvPr>
-          <p:cNvSpPr txBox="1"/>
-          <p:nvPr/>
-        </p:nvSpPr>
-        <p:spPr>
-          <a:xfrm>
-            <a:off x="75245" y="3733703"/>
-            <a:ext cx="2898551" cy="923330"/>
-          </a:xfrm>
-          <a:prstGeom prst="rect">
-            <a:avLst/>
-          </a:prstGeom>
-          <a:noFill/>
-        </p:spPr>
-        <p:txBody>
-          <a:bodyPr wrap="square" rtlCol="0">
-            <a:spAutoFit/>
-          </a:bodyPr>
-          <a:lstStyle/>
-          <a:p>
-            <a:pPr marL="342900" indent="-342900">
-              <a:buFont typeface="+mj-lt"/>
-              <a:buAutoNum type="arabicPeriod"/>
-            </a:pPr>
-            <a:r>
-              <a:rPr lang="en-CH" dirty="0"/>
-              <a:t>Get all bindings</a:t>
-            </a:r>
-          </a:p>
-          <a:p>
-            <a:pPr marL="342900" indent="-342900">
-              <a:buFont typeface="+mj-lt"/>
-              <a:buAutoNum type="arabicPeriod"/>
-            </a:pPr>
-            <a:r>
-              <a:rPr lang="en-CH" dirty="0"/>
-              <a:t>For each binding:</a:t>
-            </a:r>
-          </a:p>
-          <a:p>
-            <a:pPr marL="800100" lvl="1" indent="-342900">
-              <a:buFont typeface="+mj-lt"/>
-              <a:buAutoNum type="arabicPeriod"/>
-            </a:pPr>
-            <a:r>
-              <a:rPr lang="en-GB" dirty="0"/>
-              <a:t>T</a:t>
-            </a:r>
-            <a:r>
-              <a:rPr lang="en-CH" dirty="0"/>
-              <a:t>rigger </a:t>
-            </a:r>
-            <a:r>
-              <a:rPr lang="en-CH" b="1" dirty="0"/>
-              <a:t>find</a:t>
-            </a:r>
-          </a:p>
-        </p:txBody>
-      </p:sp>
-      <p:cxnSp>
-        <p:nvCxnSpPr>
-          <p:cNvPr id="29" name="Straight Arrow Connector 28">
-            <a:extLst>
-              <a:ext uri="{FF2B5EF4-FFF2-40B4-BE49-F238E27FC236}">
-                <a16:creationId xmlns:a16="http://schemas.microsoft.com/office/drawing/2014/main" id="{8D3BCEFF-4AA9-D84A-9A0F-EDC87A47B6B6}"/>
+                <a16:creationId xmlns:a16="http://schemas.microsoft.com/office/drawing/2014/main" id="{B4AF7AC7-9911-1E44-B77D-4DBE4F11F919}"/>
               </a:ext>
             </a:extLst>
           </p:cNvPr>
@@ -4249,14 +4569,856 @@
           <p:nvPr/>
         </p:nvCxnSpPr>
         <p:spPr>
+          <a:xfrm>
+            <a:off x="3413948" y="5053626"/>
+            <a:ext cx="0" cy="749895"/>
+          </a:xfrm>
+          <a:prstGeom prst="straightConnector1">
+            <a:avLst/>
+          </a:prstGeom>
+          <a:ln w="38100">
+            <a:solidFill>
+              <a:schemeClr val="tx1"/>
+            </a:solidFill>
+            <a:tailEnd type="triangle"/>
+          </a:ln>
+        </p:spPr>
+        <p:style>
+          <a:lnRef idx="1">
+            <a:schemeClr val="accent1"/>
+          </a:lnRef>
+          <a:fillRef idx="0">
+            <a:schemeClr val="accent1"/>
+          </a:fillRef>
+          <a:effectRef idx="0">
+            <a:schemeClr val="accent1"/>
+          </a:effectRef>
+          <a:fontRef idx="minor">
+            <a:schemeClr val="tx1"/>
+          </a:fontRef>
+        </p:style>
+      </p:cxnSp>
+      <p:sp>
+        <p:nvSpPr>
+          <p:cNvPr id="77" name="TextBox 76">
+            <a:extLst>
+              <a:ext uri="{FF2B5EF4-FFF2-40B4-BE49-F238E27FC236}">
+                <a16:creationId xmlns:a16="http://schemas.microsoft.com/office/drawing/2014/main" id="{CEEE9991-087E-C244-952A-35DF0DC48ACC}"/>
+              </a:ext>
+            </a:extLst>
+          </p:cNvPr>
+          <p:cNvSpPr txBox="1"/>
+          <p:nvPr/>
+        </p:nvSpPr>
+        <p:spPr>
+          <a:xfrm>
+            <a:off x="2023253" y="6832923"/>
+            <a:ext cx="3516962" cy="369332"/>
+          </a:xfrm>
+          <a:prstGeom prst="rect">
+            <a:avLst/>
+          </a:prstGeom>
+          <a:noFill/>
+        </p:spPr>
+        <p:txBody>
+          <a:bodyPr wrap="square" rtlCol="0">
+            <a:spAutoFit/>
+          </a:bodyPr>
+          <a:lstStyle/>
+          <a:p>
+            <a:r>
+              <a:rPr lang="en-GB" b="1" dirty="0"/>
+              <a:t>s</a:t>
+            </a:r>
+            <a:r>
+              <a:rPr lang="en-CH" b="1" dirty="0"/>
+              <a:t>hinyapp.connect(initialValues)</a:t>
+            </a:r>
+          </a:p>
+        </p:txBody>
+      </p:sp>
+      <p:sp>
+        <p:nvSpPr>
+          <p:cNvPr id="81" name="TextBox 80">
+            <a:extLst>
+              <a:ext uri="{FF2B5EF4-FFF2-40B4-BE49-F238E27FC236}">
+                <a16:creationId xmlns:a16="http://schemas.microsoft.com/office/drawing/2014/main" id="{90B21A57-F4E2-DE4C-AC2E-2187E041601E}"/>
+              </a:ext>
+            </a:extLst>
+          </p:cNvPr>
+          <p:cNvSpPr txBox="1"/>
+          <p:nvPr/>
+        </p:nvSpPr>
+        <p:spPr>
+          <a:xfrm>
+            <a:off x="1970893" y="7683054"/>
+            <a:ext cx="4396055" cy="1323439"/>
+          </a:xfrm>
+          <a:prstGeom prst="rect">
+            <a:avLst/>
+          </a:prstGeom>
+          <a:noFill/>
+        </p:spPr>
+        <p:txBody>
+          <a:bodyPr wrap="square" rtlCol="0">
+            <a:spAutoFit/>
+          </a:bodyPr>
+          <a:lstStyle/>
+          <a:p>
+            <a:r>
+              <a:rPr lang="en-CH" sz="1600" dirty="0"/>
+              <a:t>createSocket()</a:t>
+            </a:r>
+          </a:p>
+          <a:p>
+            <a:pPr marL="285750" indent="-285750">
+              <a:buFont typeface="Arial" panose="020B0604020202020204" pitchFamily="34" charset="0"/>
+              <a:buChar char="•"/>
+            </a:pPr>
+            <a:r>
+              <a:rPr lang="en-GB" sz="1600" dirty="0"/>
+              <a:t>I</a:t>
+            </a:r>
+            <a:r>
+              <a:rPr lang="en-CH" sz="1600" dirty="0"/>
+              <a:t>nit </a:t>
+            </a:r>
+            <a:r>
+              <a:rPr lang="en-CH" sz="1600" b="1" dirty="0"/>
+              <a:t>client websocket</a:t>
+            </a:r>
+          </a:p>
+          <a:p>
+            <a:pPr marL="285750" indent="-285750">
+              <a:buFont typeface="Arial" panose="020B0604020202020204" pitchFamily="34" charset="0"/>
+              <a:buChar char="•"/>
+            </a:pPr>
+            <a:r>
+              <a:rPr lang="en-GB" sz="1600" dirty="0"/>
+              <a:t>T</a:t>
+            </a:r>
+            <a:r>
+              <a:rPr lang="en-CH" sz="1600" dirty="0"/>
+              <a:t>rigger </a:t>
+            </a:r>
+            <a:r>
+              <a:rPr lang="en-CH" sz="1600" b="1" dirty="0">
+                <a:solidFill>
+                  <a:srgbClr val="0070C0"/>
+                </a:solidFill>
+              </a:rPr>
+              <a:t>shiny:connected</a:t>
+            </a:r>
+          </a:p>
+          <a:p>
+            <a:pPr marL="285750" indent="-285750">
+              <a:buFont typeface="Arial" panose="020B0604020202020204" pitchFamily="34" charset="0"/>
+              <a:buChar char="•"/>
+            </a:pPr>
+            <a:r>
+              <a:rPr lang="en-CH" sz="1600" dirty="0"/>
+              <a:t>Remove disconnected overlay</a:t>
+            </a:r>
+          </a:p>
+          <a:p>
+            <a:pPr marL="285750" indent="-285750">
+              <a:buFont typeface="Arial" panose="020B0604020202020204" pitchFamily="34" charset="0"/>
+              <a:buChar char="•"/>
+            </a:pPr>
+            <a:r>
+              <a:rPr lang="en-CH" sz="1600" dirty="0"/>
+              <a:t>Send initialValues to the </a:t>
+            </a:r>
+            <a:r>
+              <a:rPr lang="en-CH" sz="1600" b="1" dirty="0"/>
+              <a:t>server (batch)</a:t>
+            </a:r>
+            <a:r>
+              <a:rPr lang="en-CH" sz="1600" dirty="0"/>
+              <a:t> </a:t>
+            </a:r>
+          </a:p>
+        </p:txBody>
+      </p:sp>
+      <p:sp>
+        <p:nvSpPr>
+          <p:cNvPr id="83" name="TextBox 82">
+            <a:extLst>
+              <a:ext uri="{FF2B5EF4-FFF2-40B4-BE49-F238E27FC236}">
+                <a16:creationId xmlns:a16="http://schemas.microsoft.com/office/drawing/2014/main" id="{640CE1D8-108E-B441-BF10-EAE2B8219470}"/>
+              </a:ext>
+            </a:extLst>
+          </p:cNvPr>
+          <p:cNvSpPr txBox="1"/>
+          <p:nvPr/>
+        </p:nvSpPr>
+        <p:spPr>
+          <a:xfrm>
+            <a:off x="2356971" y="9584975"/>
+            <a:ext cx="3010102" cy="369332"/>
+          </a:xfrm>
+          <a:prstGeom prst="rect">
+            <a:avLst/>
+          </a:prstGeom>
+          <a:noFill/>
+        </p:spPr>
+        <p:txBody>
+          <a:bodyPr wrap="square" rtlCol="0">
+            <a:spAutoFit/>
+          </a:bodyPr>
+          <a:lstStyle/>
+          <a:p>
+            <a:r>
+              <a:rPr lang="en-GB" b="1" dirty="0">
+                <a:solidFill>
+                  <a:srgbClr val="0070C0"/>
+                </a:solidFill>
+              </a:rPr>
+              <a:t>s</a:t>
+            </a:r>
+            <a:r>
+              <a:rPr lang="en-CH" b="1" dirty="0">
+                <a:solidFill>
+                  <a:srgbClr val="0070C0"/>
+                </a:solidFill>
+              </a:rPr>
+              <a:t>hiny:sessioninitialized</a:t>
+            </a:r>
+          </a:p>
+        </p:txBody>
+      </p:sp>
+      <p:cxnSp>
+        <p:nvCxnSpPr>
+          <p:cNvPr id="84" name="Straight Arrow Connector 83">
+            <a:extLst>
+              <a:ext uri="{FF2B5EF4-FFF2-40B4-BE49-F238E27FC236}">
+                <a16:creationId xmlns:a16="http://schemas.microsoft.com/office/drawing/2014/main" id="{091F11C1-29D8-6344-9B4C-33652335F917}"/>
+              </a:ext>
+            </a:extLst>
+          </p:cNvPr>
+          <p:cNvCxnSpPr>
+            <a:cxnSpLocks/>
+          </p:cNvCxnSpPr>
+          <p:nvPr/>
+        </p:nvCxnSpPr>
+        <p:spPr>
           <a:xfrm flipH="1">
-            <a:off x="1083013" y="4743001"/>
-            <a:ext cx="576368" cy="558781"/>
+            <a:off x="5334304" y="1958248"/>
+            <a:ext cx="654850" cy="1"/>
           </a:xfrm>
           <a:prstGeom prst="straightConnector1">
             <a:avLst/>
           </a:prstGeom>
-          <a:ln>
+          <a:ln w="38100">
+            <a:solidFill>
+              <a:schemeClr val="tx1"/>
+            </a:solidFill>
+            <a:tailEnd type="triangle"/>
+          </a:ln>
+        </p:spPr>
+        <p:style>
+          <a:lnRef idx="1">
+            <a:schemeClr val="accent1"/>
+          </a:lnRef>
+          <a:fillRef idx="0">
+            <a:schemeClr val="accent1"/>
+          </a:fillRef>
+          <a:effectRef idx="0">
+            <a:schemeClr val="accent1"/>
+          </a:effectRef>
+          <a:fontRef idx="minor">
+            <a:schemeClr val="tx1"/>
+          </a:fontRef>
+        </p:style>
+      </p:cxnSp>
+      <p:sp>
+        <p:nvSpPr>
+          <p:cNvPr id="86" name="TextBox 85">
+            <a:extLst>
+              <a:ext uri="{FF2B5EF4-FFF2-40B4-BE49-F238E27FC236}">
+                <a16:creationId xmlns:a16="http://schemas.microsoft.com/office/drawing/2014/main" id="{F6F18A8B-9372-9547-B910-F7A4E0928935}"/>
+              </a:ext>
+            </a:extLst>
+          </p:cNvPr>
+          <p:cNvSpPr txBox="1"/>
+          <p:nvPr/>
+        </p:nvSpPr>
+        <p:spPr>
+          <a:xfrm>
+            <a:off x="6002748" y="1514780"/>
+            <a:ext cx="1110996" cy="923330"/>
+          </a:xfrm>
+          <a:prstGeom prst="rect">
+            <a:avLst/>
+          </a:prstGeom>
+          <a:noFill/>
+        </p:spPr>
+        <p:txBody>
+          <a:bodyPr wrap="square" rtlCol="0">
+            <a:spAutoFit/>
+          </a:bodyPr>
+          <a:lstStyle/>
+          <a:p>
+            <a:r>
+              <a:rPr lang="en-GB" dirty="0"/>
+              <a:t>U</a:t>
+            </a:r>
+            <a:r>
+              <a:rPr lang="en-CH" dirty="0"/>
+              <a:t>ser defined inputs</a:t>
+            </a:r>
+          </a:p>
+        </p:txBody>
+      </p:sp>
+      <p:sp>
+        <p:nvSpPr>
+          <p:cNvPr id="87" name="TextBox 86">
+            <a:extLst>
+              <a:ext uri="{FF2B5EF4-FFF2-40B4-BE49-F238E27FC236}">
+                <a16:creationId xmlns:a16="http://schemas.microsoft.com/office/drawing/2014/main" id="{A832354E-5B1A-4646-B0FE-52EF5EA740DE}"/>
+              </a:ext>
+            </a:extLst>
+          </p:cNvPr>
+          <p:cNvSpPr txBox="1"/>
+          <p:nvPr/>
+        </p:nvSpPr>
+        <p:spPr>
+          <a:xfrm>
+            <a:off x="5185541" y="1387994"/>
+            <a:ext cx="952375" cy="369332"/>
+          </a:xfrm>
+          <a:prstGeom prst="rect">
+            <a:avLst/>
+          </a:prstGeom>
+          <a:noFill/>
+        </p:spPr>
+        <p:txBody>
+          <a:bodyPr wrap="square" rtlCol="0">
+            <a:spAutoFit/>
+          </a:bodyPr>
+          <a:lstStyle/>
+          <a:p>
+            <a:r>
+              <a:rPr lang="en-CH" b="1" dirty="0"/>
+              <a:t>register</a:t>
+            </a:r>
+          </a:p>
+        </p:txBody>
+      </p:sp>
+      <p:cxnSp>
+        <p:nvCxnSpPr>
+          <p:cNvPr id="52" name="Straight Arrow Connector 51">
+            <a:extLst>
+              <a:ext uri="{FF2B5EF4-FFF2-40B4-BE49-F238E27FC236}">
+                <a16:creationId xmlns:a16="http://schemas.microsoft.com/office/drawing/2014/main" id="{3A49ED5E-5471-F942-85EC-F797BA214B90}"/>
+              </a:ext>
+            </a:extLst>
+          </p:cNvPr>
+          <p:cNvCxnSpPr>
+            <a:cxnSpLocks/>
+          </p:cNvCxnSpPr>
+          <p:nvPr/>
+        </p:nvCxnSpPr>
+        <p:spPr>
+          <a:xfrm flipH="1" flipV="1">
+            <a:off x="3700297" y="384073"/>
+            <a:ext cx="1" cy="762009"/>
+          </a:xfrm>
+          <a:prstGeom prst="straightConnector1">
+            <a:avLst/>
+          </a:prstGeom>
+          <a:ln w="38100">
+            <a:solidFill>
+              <a:schemeClr val="tx1"/>
+            </a:solidFill>
+            <a:tailEnd type="triangle"/>
+          </a:ln>
+        </p:spPr>
+        <p:style>
+          <a:lnRef idx="1">
+            <a:schemeClr val="accent1"/>
+          </a:lnRef>
+          <a:fillRef idx="0">
+            <a:schemeClr val="accent1"/>
+          </a:fillRef>
+          <a:effectRef idx="0">
+            <a:schemeClr val="accent1"/>
+          </a:effectRef>
+          <a:fontRef idx="minor">
+            <a:schemeClr val="tx1"/>
+          </a:fontRef>
+        </p:style>
+      </p:cxnSp>
+      <p:sp>
+        <p:nvSpPr>
+          <p:cNvPr id="21" name="Rectangle 20">
+            <a:extLst>
+              <a:ext uri="{FF2B5EF4-FFF2-40B4-BE49-F238E27FC236}">
+                <a16:creationId xmlns:a16="http://schemas.microsoft.com/office/drawing/2014/main" id="{688D0D79-7C54-1F41-9D74-3067F230B314}"/>
+              </a:ext>
+            </a:extLst>
+          </p:cNvPr>
+          <p:cNvSpPr/>
+          <p:nvPr/>
+        </p:nvSpPr>
+        <p:spPr>
+          <a:xfrm>
+            <a:off x="110711" y="3718773"/>
+            <a:ext cx="1128329" cy="646331"/>
+          </a:xfrm>
+          <a:prstGeom prst="rect">
+            <a:avLst/>
+          </a:prstGeom>
+        </p:spPr>
+        <p:txBody>
+          <a:bodyPr wrap="square">
+            <a:spAutoFit/>
+          </a:bodyPr>
+          <a:lstStyle/>
+          <a:p>
+            <a:r>
+              <a:rPr lang="en-CH" dirty="0"/>
+              <a:t>Get all bindings</a:t>
+            </a:r>
+          </a:p>
+        </p:txBody>
+      </p:sp>
+      <p:cxnSp>
+        <p:nvCxnSpPr>
+          <p:cNvPr id="57" name="Straight Arrow Connector 56">
+            <a:extLst>
+              <a:ext uri="{FF2B5EF4-FFF2-40B4-BE49-F238E27FC236}">
+                <a16:creationId xmlns:a16="http://schemas.microsoft.com/office/drawing/2014/main" id="{952476E5-9111-5542-9280-F11B76C16936}"/>
+              </a:ext>
+            </a:extLst>
+          </p:cNvPr>
+          <p:cNvCxnSpPr>
+            <a:cxnSpLocks/>
+          </p:cNvCxnSpPr>
+          <p:nvPr/>
+        </p:nvCxnSpPr>
+        <p:spPr>
+          <a:xfrm flipV="1">
+            <a:off x="1068101" y="3698858"/>
+            <a:ext cx="496092" cy="326670"/>
+          </a:xfrm>
+          <a:prstGeom prst="straightConnector1">
+            <a:avLst/>
+          </a:prstGeom>
+          <a:ln w="38100">
+            <a:solidFill>
+              <a:schemeClr val="tx1"/>
+            </a:solidFill>
+            <a:tailEnd type="triangle"/>
+          </a:ln>
+        </p:spPr>
+        <p:style>
+          <a:lnRef idx="1">
+            <a:schemeClr val="accent1"/>
+          </a:lnRef>
+          <a:fillRef idx="0">
+            <a:schemeClr val="accent1"/>
+          </a:fillRef>
+          <a:effectRef idx="0">
+            <a:schemeClr val="accent1"/>
+          </a:effectRef>
+          <a:fontRef idx="minor">
+            <a:schemeClr val="tx1"/>
+          </a:fontRef>
+        </p:style>
+      </p:cxnSp>
+      <p:sp>
+        <p:nvSpPr>
+          <p:cNvPr id="34" name="TextBox 33">
+            <a:extLst>
+              <a:ext uri="{FF2B5EF4-FFF2-40B4-BE49-F238E27FC236}">
+                <a16:creationId xmlns:a16="http://schemas.microsoft.com/office/drawing/2014/main" id="{C3207DFE-FDB4-1441-98E7-E5B50ED131B7}"/>
+              </a:ext>
+            </a:extLst>
+          </p:cNvPr>
+          <p:cNvSpPr txBox="1"/>
+          <p:nvPr/>
+        </p:nvSpPr>
+        <p:spPr>
+          <a:xfrm>
+            <a:off x="990613" y="4170586"/>
+            <a:ext cx="593432" cy="369332"/>
+          </a:xfrm>
+          <a:prstGeom prst="rect">
+            <a:avLst/>
+          </a:prstGeom>
+          <a:noFill/>
+        </p:spPr>
+        <p:txBody>
+          <a:bodyPr wrap="none" rtlCol="0">
+            <a:spAutoFit/>
+          </a:bodyPr>
+          <a:lstStyle/>
+          <a:p>
+            <a:r>
+              <a:rPr lang="en-CH" b="1" dirty="0"/>
+              <a:t>Find</a:t>
+            </a:r>
+          </a:p>
+        </p:txBody>
+      </p:sp>
+      <p:cxnSp>
+        <p:nvCxnSpPr>
+          <p:cNvPr id="65" name="Straight Arrow Connector 64">
+            <a:extLst>
+              <a:ext uri="{FF2B5EF4-FFF2-40B4-BE49-F238E27FC236}">
+                <a16:creationId xmlns:a16="http://schemas.microsoft.com/office/drawing/2014/main" id="{009F9F2C-F428-7149-B284-3F3E1ECCEF80}"/>
+              </a:ext>
+            </a:extLst>
+          </p:cNvPr>
+          <p:cNvCxnSpPr>
+            <a:cxnSpLocks/>
+          </p:cNvCxnSpPr>
+          <p:nvPr/>
+        </p:nvCxnSpPr>
+        <p:spPr>
+          <a:xfrm>
+            <a:off x="1068101" y="4038187"/>
+            <a:ext cx="500783" cy="165869"/>
+          </a:xfrm>
+          <a:prstGeom prst="straightConnector1">
+            <a:avLst/>
+          </a:prstGeom>
+          <a:ln w="38100">
+            <a:solidFill>
+              <a:schemeClr val="tx1"/>
+            </a:solidFill>
+            <a:tailEnd type="triangle"/>
+          </a:ln>
+        </p:spPr>
+        <p:style>
+          <a:lnRef idx="1">
+            <a:schemeClr val="accent1"/>
+          </a:lnRef>
+          <a:fillRef idx="0">
+            <a:schemeClr val="accent1"/>
+          </a:fillRef>
+          <a:effectRef idx="0">
+            <a:schemeClr val="accent1"/>
+          </a:effectRef>
+          <a:fontRef idx="minor">
+            <a:schemeClr val="tx1"/>
+          </a:fontRef>
+        </p:style>
+      </p:cxnSp>
+      <p:sp>
+        <p:nvSpPr>
+          <p:cNvPr id="42" name="TextBox 41">
+            <a:extLst>
+              <a:ext uri="{FF2B5EF4-FFF2-40B4-BE49-F238E27FC236}">
+                <a16:creationId xmlns:a16="http://schemas.microsoft.com/office/drawing/2014/main" id="{8A70D2A3-E29A-C145-AB5A-58A2BBA3F054}"/>
+              </a:ext>
+            </a:extLst>
+          </p:cNvPr>
+          <p:cNvSpPr txBox="1"/>
+          <p:nvPr/>
+        </p:nvSpPr>
+        <p:spPr>
+          <a:xfrm>
+            <a:off x="1540991" y="3473116"/>
+            <a:ext cx="1128328" cy="369332"/>
+          </a:xfrm>
+          <a:prstGeom prst="rect">
+            <a:avLst/>
+          </a:prstGeom>
+          <a:noFill/>
+        </p:spPr>
+        <p:txBody>
+          <a:bodyPr wrap="square" rtlCol="0">
+            <a:spAutoFit/>
+          </a:bodyPr>
+          <a:lstStyle/>
+          <a:p>
+            <a:r>
+              <a:rPr lang="en-CH" dirty="0"/>
+              <a:t>NO: stop</a:t>
+            </a:r>
+          </a:p>
+        </p:txBody>
+      </p:sp>
+      <p:sp>
+        <p:nvSpPr>
+          <p:cNvPr id="71" name="TextBox 70">
+            <a:extLst>
+              <a:ext uri="{FF2B5EF4-FFF2-40B4-BE49-F238E27FC236}">
+                <a16:creationId xmlns:a16="http://schemas.microsoft.com/office/drawing/2014/main" id="{689DB109-02CA-434B-AD63-6EC6DEC1827F}"/>
+              </a:ext>
+            </a:extLst>
+          </p:cNvPr>
+          <p:cNvSpPr txBox="1"/>
+          <p:nvPr/>
+        </p:nvSpPr>
+        <p:spPr>
+          <a:xfrm>
+            <a:off x="1527664" y="4002513"/>
+            <a:ext cx="1128328" cy="369332"/>
+          </a:xfrm>
+          <a:prstGeom prst="rect">
+            <a:avLst/>
+          </a:prstGeom>
+          <a:noFill/>
+        </p:spPr>
+        <p:txBody>
+          <a:bodyPr wrap="square" rtlCol="0">
+            <a:spAutoFit/>
+          </a:bodyPr>
+          <a:lstStyle/>
+          <a:p>
+            <a:r>
+              <a:rPr lang="en-CH" dirty="0"/>
+              <a:t>YES</a:t>
+            </a:r>
+          </a:p>
+        </p:txBody>
+      </p:sp>
+      <p:cxnSp>
+        <p:nvCxnSpPr>
+          <p:cNvPr id="78" name="Straight Arrow Connector 77">
+            <a:extLst>
+              <a:ext uri="{FF2B5EF4-FFF2-40B4-BE49-F238E27FC236}">
+                <a16:creationId xmlns:a16="http://schemas.microsoft.com/office/drawing/2014/main" id="{93F26E33-BB1D-4244-A707-EF871183D46F}"/>
+              </a:ext>
+            </a:extLst>
+          </p:cNvPr>
+          <p:cNvCxnSpPr>
+            <a:cxnSpLocks/>
+            <a:endCxn id="71" idx="3"/>
+          </p:cNvCxnSpPr>
+          <p:nvPr/>
+        </p:nvCxnSpPr>
+        <p:spPr>
+          <a:xfrm flipV="1">
+            <a:off x="2010514" y="4187179"/>
+            <a:ext cx="645478" cy="6498"/>
+          </a:xfrm>
+          <a:prstGeom prst="straightConnector1">
+            <a:avLst/>
+          </a:prstGeom>
+          <a:ln w="38100">
+            <a:solidFill>
+              <a:schemeClr val="tx1"/>
+            </a:solidFill>
+            <a:tailEnd type="triangle"/>
+          </a:ln>
+        </p:spPr>
+        <p:style>
+          <a:lnRef idx="1">
+            <a:schemeClr val="accent1"/>
+          </a:lnRef>
+          <a:fillRef idx="0">
+            <a:schemeClr val="accent1"/>
+          </a:fillRef>
+          <a:effectRef idx="0">
+            <a:schemeClr val="accent1"/>
+          </a:effectRef>
+          <a:fontRef idx="minor">
+            <a:schemeClr val="tx1"/>
+          </a:fontRef>
+        </p:style>
+      </p:cxnSp>
+      <p:sp>
+        <p:nvSpPr>
+          <p:cNvPr id="56" name="TextBox 55">
+            <a:extLst>
+              <a:ext uri="{FF2B5EF4-FFF2-40B4-BE49-F238E27FC236}">
+                <a16:creationId xmlns:a16="http://schemas.microsoft.com/office/drawing/2014/main" id="{6EF73C5F-E14F-CA43-83A0-437A5357259B}"/>
+              </a:ext>
+            </a:extLst>
+          </p:cNvPr>
+          <p:cNvSpPr txBox="1"/>
+          <p:nvPr/>
+        </p:nvSpPr>
+        <p:spPr>
+          <a:xfrm>
+            <a:off x="543988" y="458279"/>
+            <a:ext cx="474810" cy="400110"/>
+          </a:xfrm>
+          <a:prstGeom prst="rect">
+            <a:avLst/>
+          </a:prstGeom>
+          <a:noFill/>
+        </p:spPr>
+        <p:txBody>
+          <a:bodyPr wrap="none" rtlCol="0">
+            <a:spAutoFit/>
+          </a:bodyPr>
+          <a:lstStyle/>
+          <a:p>
+            <a:r>
+              <a:rPr lang="en-CH" sz="2000" b="1" dirty="0"/>
+              <a:t>(1)</a:t>
+            </a:r>
+          </a:p>
+        </p:txBody>
+      </p:sp>
+      <p:sp>
+        <p:nvSpPr>
+          <p:cNvPr id="85" name="TextBox 84">
+            <a:extLst>
+              <a:ext uri="{FF2B5EF4-FFF2-40B4-BE49-F238E27FC236}">
+                <a16:creationId xmlns:a16="http://schemas.microsoft.com/office/drawing/2014/main" id="{6AC1AE1A-7033-6E47-A3D2-F2566E07740D}"/>
+              </a:ext>
+            </a:extLst>
+          </p:cNvPr>
+          <p:cNvSpPr txBox="1"/>
+          <p:nvPr/>
+        </p:nvSpPr>
+        <p:spPr>
+          <a:xfrm>
+            <a:off x="2046619" y="275240"/>
+            <a:ext cx="540533" cy="400110"/>
+          </a:xfrm>
+          <a:prstGeom prst="rect">
+            <a:avLst/>
+          </a:prstGeom>
+          <a:noFill/>
+        </p:spPr>
+        <p:txBody>
+          <a:bodyPr wrap="none" rtlCol="0">
+            <a:spAutoFit/>
+          </a:bodyPr>
+          <a:lstStyle/>
+          <a:p>
+            <a:r>
+              <a:rPr lang="en-CH" sz="2000" b="1" dirty="0"/>
+              <a:t>(1’)</a:t>
+            </a:r>
+          </a:p>
+        </p:txBody>
+      </p:sp>
+      <p:sp>
+        <p:nvSpPr>
+          <p:cNvPr id="88" name="TextBox 87">
+            <a:extLst>
+              <a:ext uri="{FF2B5EF4-FFF2-40B4-BE49-F238E27FC236}">
+                <a16:creationId xmlns:a16="http://schemas.microsoft.com/office/drawing/2014/main" id="{E765FE17-88F4-C845-8AFE-66F24CD47785}"/>
+              </a:ext>
+            </a:extLst>
+          </p:cNvPr>
+          <p:cNvSpPr txBox="1"/>
+          <p:nvPr/>
+        </p:nvSpPr>
+        <p:spPr>
+          <a:xfrm>
+            <a:off x="317562" y="2872388"/>
+            <a:ext cx="474810" cy="400110"/>
+          </a:xfrm>
+          <a:prstGeom prst="rect">
+            <a:avLst/>
+          </a:prstGeom>
+          <a:noFill/>
+        </p:spPr>
+        <p:txBody>
+          <a:bodyPr wrap="none" rtlCol="0">
+            <a:spAutoFit/>
+          </a:bodyPr>
+          <a:lstStyle/>
+          <a:p>
+            <a:r>
+              <a:rPr lang="en-CH" sz="2000" b="1" dirty="0"/>
+              <a:t>(2)</a:t>
+            </a:r>
+          </a:p>
+        </p:txBody>
+      </p:sp>
+      <p:sp>
+        <p:nvSpPr>
+          <p:cNvPr id="89" name="TextBox 88">
+            <a:extLst>
+              <a:ext uri="{FF2B5EF4-FFF2-40B4-BE49-F238E27FC236}">
+                <a16:creationId xmlns:a16="http://schemas.microsoft.com/office/drawing/2014/main" id="{B0934B84-F903-4044-B111-2513399619CB}"/>
+              </a:ext>
+            </a:extLst>
+          </p:cNvPr>
+          <p:cNvSpPr txBox="1"/>
+          <p:nvPr/>
+        </p:nvSpPr>
+        <p:spPr>
+          <a:xfrm>
+            <a:off x="1066063" y="4477340"/>
+            <a:ext cx="474810" cy="400110"/>
+          </a:xfrm>
+          <a:prstGeom prst="rect">
+            <a:avLst/>
+          </a:prstGeom>
+          <a:noFill/>
+        </p:spPr>
+        <p:txBody>
+          <a:bodyPr wrap="none" rtlCol="0">
+            <a:spAutoFit/>
+          </a:bodyPr>
+          <a:lstStyle/>
+          <a:p>
+            <a:r>
+              <a:rPr lang="en-CH" sz="2000" b="1" dirty="0"/>
+              <a:t>(3)</a:t>
+            </a:r>
+          </a:p>
+        </p:txBody>
+      </p:sp>
+      <p:sp>
+        <p:nvSpPr>
+          <p:cNvPr id="90" name="TextBox 89">
+            <a:extLst>
+              <a:ext uri="{FF2B5EF4-FFF2-40B4-BE49-F238E27FC236}">
+                <a16:creationId xmlns:a16="http://schemas.microsoft.com/office/drawing/2014/main" id="{F260ADD2-92DE-7044-B213-0EC0116578C2}"/>
+              </a:ext>
+            </a:extLst>
+          </p:cNvPr>
+          <p:cNvSpPr txBox="1"/>
+          <p:nvPr/>
+        </p:nvSpPr>
+        <p:spPr>
+          <a:xfrm>
+            <a:off x="2014476" y="4204929"/>
+            <a:ext cx="474810" cy="400110"/>
+          </a:xfrm>
+          <a:prstGeom prst="rect">
+            <a:avLst/>
+          </a:prstGeom>
+          <a:noFill/>
+        </p:spPr>
+        <p:txBody>
+          <a:bodyPr wrap="none" rtlCol="0">
+            <a:spAutoFit/>
+          </a:bodyPr>
+          <a:lstStyle/>
+          <a:p>
+            <a:r>
+              <a:rPr lang="en-CH" sz="2000" b="1" dirty="0"/>
+              <a:t>(4)</a:t>
+            </a:r>
+          </a:p>
+        </p:txBody>
+      </p:sp>
+      <p:cxnSp>
+        <p:nvCxnSpPr>
+          <p:cNvPr id="91" name="Straight Arrow Connector 90">
+            <a:extLst>
+              <a:ext uri="{FF2B5EF4-FFF2-40B4-BE49-F238E27FC236}">
+                <a16:creationId xmlns:a16="http://schemas.microsoft.com/office/drawing/2014/main" id="{A17153B6-9ADC-134D-8CA2-B8CEFE3A8327}"/>
+              </a:ext>
+            </a:extLst>
+          </p:cNvPr>
+          <p:cNvCxnSpPr>
+            <a:cxnSpLocks/>
+          </p:cNvCxnSpPr>
+          <p:nvPr/>
+        </p:nvCxnSpPr>
+        <p:spPr>
+          <a:xfrm>
+            <a:off x="3429000" y="6139648"/>
+            <a:ext cx="0" cy="749895"/>
+          </a:xfrm>
+          <a:prstGeom prst="straightConnector1">
+            <a:avLst/>
+          </a:prstGeom>
+          <a:ln w="38100">
             <a:solidFill>
               <a:schemeClr val="tx1"/>
             </a:solidFill>
@@ -4280,10 +5442,10 @@
       </p:cxnSp>
       <p:cxnSp>
         <p:nvCxnSpPr>
-          <p:cNvPr id="32" name="Straight Arrow Connector 31">
+          <p:cNvPr id="92" name="Straight Arrow Connector 91">
             <a:extLst>
               <a:ext uri="{FF2B5EF4-FFF2-40B4-BE49-F238E27FC236}">
-                <a16:creationId xmlns:a16="http://schemas.microsoft.com/office/drawing/2014/main" id="{1D741B8F-0808-3E44-BBCF-717E11731CD1}"/>
+                <a16:creationId xmlns:a16="http://schemas.microsoft.com/office/drawing/2014/main" id="{94B97E90-4E0F-E744-8C4D-187FCF4BD434}"/>
               </a:ext>
             </a:extLst>
           </p:cNvPr>
@@ -4294,393 +5456,13 @@
         </p:nvCxnSpPr>
         <p:spPr>
           <a:xfrm>
-            <a:off x="1845218" y="4743001"/>
-            <a:ext cx="559674" cy="529097"/>
+            <a:off x="3446262" y="7202255"/>
+            <a:ext cx="0" cy="749895"/>
           </a:xfrm>
           <a:prstGeom prst="straightConnector1">
             <a:avLst/>
           </a:prstGeom>
-          <a:ln>
-            <a:solidFill>
-              <a:schemeClr val="tx1"/>
-            </a:solidFill>
-            <a:tailEnd type="triangle"/>
-          </a:ln>
-        </p:spPr>
-        <p:style>
-          <a:lnRef idx="1">
-            <a:schemeClr val="accent1"/>
-          </a:lnRef>
-          <a:fillRef idx="0">
-            <a:schemeClr val="accent1"/>
-          </a:fillRef>
-          <a:effectRef idx="0">
-            <a:schemeClr val="accent1"/>
-          </a:effectRef>
-          <a:fontRef idx="minor">
-            <a:schemeClr val="tx1"/>
-          </a:fontRef>
-        </p:style>
-      </p:cxnSp>
-      <p:sp>
-        <p:nvSpPr>
-          <p:cNvPr id="36" name="TextBox 35">
-            <a:extLst>
-              <a:ext uri="{FF2B5EF4-FFF2-40B4-BE49-F238E27FC236}">
-                <a16:creationId xmlns:a16="http://schemas.microsoft.com/office/drawing/2014/main" id="{E7E4A127-9350-F845-BBED-95AF8FD38EEF}"/>
-              </a:ext>
-            </a:extLst>
-          </p:cNvPr>
-          <p:cNvSpPr txBox="1"/>
-          <p:nvPr/>
-        </p:nvSpPr>
-        <p:spPr>
-          <a:xfrm>
-            <a:off x="875847" y="4625711"/>
-            <a:ext cx="669659" cy="369332"/>
-          </a:xfrm>
-          <a:prstGeom prst="rect">
-            <a:avLst/>
-          </a:prstGeom>
-          <a:noFill/>
-        </p:spPr>
-        <p:txBody>
-          <a:bodyPr wrap="square" rtlCol="0">
-            <a:spAutoFit/>
-          </a:bodyPr>
-          <a:lstStyle/>
-          <a:p>
-            <a:r>
-              <a:rPr lang="en-CH" dirty="0"/>
-              <a:t>yes</a:t>
-            </a:r>
-          </a:p>
-        </p:txBody>
-      </p:sp>
-      <p:sp>
-        <p:nvSpPr>
-          <p:cNvPr id="37" name="TextBox 36">
-            <a:extLst>
-              <a:ext uri="{FF2B5EF4-FFF2-40B4-BE49-F238E27FC236}">
-                <a16:creationId xmlns:a16="http://schemas.microsoft.com/office/drawing/2014/main" id="{87C568C9-A8C0-C748-B9C5-7BB7DD83F482}"/>
-              </a:ext>
-            </a:extLst>
-          </p:cNvPr>
-          <p:cNvSpPr txBox="1"/>
-          <p:nvPr/>
-        </p:nvSpPr>
-        <p:spPr>
-          <a:xfrm>
-            <a:off x="2034280" y="4629678"/>
-            <a:ext cx="669659" cy="369332"/>
-          </a:xfrm>
-          <a:prstGeom prst="rect">
-            <a:avLst/>
-          </a:prstGeom>
-          <a:noFill/>
-        </p:spPr>
-        <p:txBody>
-          <a:bodyPr wrap="square" rtlCol="0">
-            <a:spAutoFit/>
-          </a:bodyPr>
-          <a:lstStyle/>
-          <a:p>
-            <a:r>
-              <a:rPr lang="en-CH" dirty="0"/>
-              <a:t>no</a:t>
-            </a:r>
-          </a:p>
-        </p:txBody>
-      </p:sp>
-      <p:sp>
-        <p:nvSpPr>
-          <p:cNvPr id="38" name="TextBox 37">
-            <a:extLst>
-              <a:ext uri="{FF2B5EF4-FFF2-40B4-BE49-F238E27FC236}">
-                <a16:creationId xmlns:a16="http://schemas.microsoft.com/office/drawing/2014/main" id="{83E67ECC-8CDB-8F49-B27C-3C2D25B6FB9A}"/>
-              </a:ext>
-            </a:extLst>
-          </p:cNvPr>
-          <p:cNvSpPr txBox="1"/>
-          <p:nvPr/>
-        </p:nvSpPr>
-        <p:spPr>
-          <a:xfrm>
-            <a:off x="1717950" y="5022391"/>
-            <a:ext cx="672616" cy="369332"/>
-          </a:xfrm>
-          <a:prstGeom prst="rect">
-            <a:avLst/>
-          </a:prstGeom>
-          <a:noFill/>
-        </p:spPr>
-        <p:txBody>
-          <a:bodyPr wrap="square" rtlCol="0">
-            <a:spAutoFit/>
-          </a:bodyPr>
-          <a:lstStyle/>
-          <a:p>
-            <a:r>
-              <a:rPr lang="en-CH" b="1" dirty="0">
-                <a:solidFill>
-                  <a:srgbClr val="FF0000"/>
-                </a:solidFill>
-              </a:rPr>
-              <a:t>stop</a:t>
-            </a:r>
-          </a:p>
-        </p:txBody>
-      </p:sp>
-      <p:sp>
-        <p:nvSpPr>
-          <p:cNvPr id="39" name="TextBox 38">
-            <a:extLst>
-              <a:ext uri="{FF2B5EF4-FFF2-40B4-BE49-F238E27FC236}">
-                <a16:creationId xmlns:a16="http://schemas.microsoft.com/office/drawing/2014/main" id="{97A49D15-3BAD-9042-9472-233F389A2CB4}"/>
-              </a:ext>
-            </a:extLst>
-          </p:cNvPr>
-          <p:cNvSpPr txBox="1"/>
-          <p:nvPr/>
-        </p:nvSpPr>
-        <p:spPr>
-          <a:xfrm>
-            <a:off x="188613" y="5351242"/>
-            <a:ext cx="1529046" cy="1200329"/>
-          </a:xfrm>
-          <a:prstGeom prst="rect">
-            <a:avLst/>
-          </a:prstGeom>
-          <a:noFill/>
-        </p:spPr>
-        <p:txBody>
-          <a:bodyPr wrap="square" rtlCol="0">
-            <a:spAutoFit/>
-          </a:bodyPr>
-          <a:lstStyle/>
-          <a:p>
-            <a:pPr marL="285750" indent="-285750">
-              <a:buFont typeface="Arial" panose="020B0604020202020204" pitchFamily="34" charset="0"/>
-              <a:buChar char="•"/>
-            </a:pPr>
-            <a:r>
-              <a:rPr lang="en-CH" b="1" dirty="0"/>
-              <a:t>getId</a:t>
-            </a:r>
-          </a:p>
-          <a:p>
-            <a:pPr marL="285750" indent="-285750">
-              <a:buFont typeface="Arial" panose="020B0604020202020204" pitchFamily="34" charset="0"/>
-              <a:buChar char="•"/>
-            </a:pPr>
-            <a:r>
-              <a:rPr lang="en-CH" b="1" dirty="0"/>
-              <a:t>getType</a:t>
-            </a:r>
-          </a:p>
-          <a:p>
-            <a:pPr marL="285750" indent="-285750">
-              <a:buFont typeface="Arial" panose="020B0604020202020204" pitchFamily="34" charset="0"/>
-              <a:buChar char="•"/>
-            </a:pPr>
-            <a:r>
-              <a:rPr lang="en-CH" b="1" dirty="0"/>
-              <a:t>getValue</a:t>
-            </a:r>
-          </a:p>
-          <a:p>
-            <a:pPr marL="285750" indent="-285750">
-              <a:buFont typeface="Arial" panose="020B0604020202020204" pitchFamily="34" charset="0"/>
-              <a:buChar char="•"/>
-            </a:pPr>
-            <a:r>
-              <a:rPr lang="en-CH" b="1" dirty="0"/>
-              <a:t>subscribe</a:t>
-            </a:r>
-          </a:p>
-        </p:txBody>
-      </p:sp>
-      <p:sp>
-        <p:nvSpPr>
-          <p:cNvPr id="40" name="TextBox 39">
-            <a:extLst>
-              <a:ext uri="{FF2B5EF4-FFF2-40B4-BE49-F238E27FC236}">
-                <a16:creationId xmlns:a16="http://schemas.microsoft.com/office/drawing/2014/main" id="{D829239B-BF4D-F545-B9D4-0D97870BC183}"/>
-              </a:ext>
-            </a:extLst>
-          </p:cNvPr>
-          <p:cNvSpPr txBox="1"/>
-          <p:nvPr/>
-        </p:nvSpPr>
-        <p:spPr>
-          <a:xfrm>
-            <a:off x="160920" y="6484013"/>
-            <a:ext cx="2362973" cy="2308324"/>
-          </a:xfrm>
-          <a:prstGeom prst="rect">
-            <a:avLst/>
-          </a:prstGeom>
-          <a:noFill/>
-        </p:spPr>
-        <p:txBody>
-          <a:bodyPr wrap="square" rtlCol="0">
-            <a:spAutoFit/>
-          </a:bodyPr>
-          <a:lstStyle/>
-          <a:p>
-            <a:r>
-              <a:rPr lang="en-CH" dirty="0"/>
-              <a:t>3. Add binding data to element</a:t>
-            </a:r>
-          </a:p>
-          <a:p>
-            <a:r>
-              <a:rPr lang="en-CH" dirty="0"/>
-              <a:t>4. Add class “shiny-bound-input”</a:t>
-            </a:r>
-          </a:p>
-          <a:p>
-            <a:r>
-              <a:rPr lang="en-CH" dirty="0"/>
-              <a:t>5. Apply </a:t>
-            </a:r>
-            <a:r>
-              <a:rPr lang="en-CH" b="1" dirty="0"/>
-              <a:t>rate policies</a:t>
-            </a:r>
-          </a:p>
-          <a:p>
-            <a:r>
-              <a:rPr lang="en-CH" dirty="0"/>
-              <a:t>6. </a:t>
-            </a:r>
-            <a:r>
-              <a:rPr lang="en-GB" dirty="0"/>
-              <a:t>A</a:t>
-            </a:r>
-            <a:r>
-              <a:rPr lang="en-CH" dirty="0"/>
-              <a:t>dd element to </a:t>
-            </a:r>
-            <a:r>
-              <a:rPr lang="en-CH" b="1" dirty="0"/>
-              <a:t>boundInputs</a:t>
-            </a:r>
-          </a:p>
-          <a:p>
-            <a:r>
-              <a:rPr lang="en-CH" dirty="0"/>
-              <a:t>7. Trigger </a:t>
-            </a:r>
-            <a:r>
-              <a:rPr lang="en-CH" b="1" dirty="0"/>
-              <a:t>shiny:bound</a:t>
-            </a:r>
-          </a:p>
-        </p:txBody>
-      </p:sp>
-      <p:cxnSp>
-        <p:nvCxnSpPr>
-          <p:cNvPr id="45" name="Curved Connector 44">
-            <a:extLst>
-              <a:ext uri="{FF2B5EF4-FFF2-40B4-BE49-F238E27FC236}">
-                <a16:creationId xmlns:a16="http://schemas.microsoft.com/office/drawing/2014/main" id="{D2984FF1-36BB-8F43-A795-37DB1C133910}"/>
-              </a:ext>
-            </a:extLst>
-          </p:cNvPr>
-          <p:cNvCxnSpPr>
-            <a:cxnSpLocks/>
-          </p:cNvCxnSpPr>
-          <p:nvPr/>
-        </p:nvCxnSpPr>
-        <p:spPr>
-          <a:xfrm flipV="1">
-            <a:off x="2079539" y="5524702"/>
-            <a:ext cx="1470607" cy="2737691"/>
-          </a:xfrm>
-          <a:prstGeom prst="curvedConnector2">
-            <a:avLst/>
-          </a:prstGeom>
-          <a:ln>
-            <a:solidFill>
-              <a:schemeClr val="tx1"/>
-            </a:solidFill>
-            <a:tailEnd type="triangle"/>
-          </a:ln>
-        </p:spPr>
-        <p:style>
-          <a:lnRef idx="1">
-            <a:schemeClr val="accent1"/>
-          </a:lnRef>
-          <a:fillRef idx="0">
-            <a:schemeClr val="accent1"/>
-          </a:fillRef>
-          <a:effectRef idx="0">
-            <a:schemeClr val="accent1"/>
-          </a:effectRef>
-          <a:fontRef idx="minor">
-            <a:schemeClr val="tx1"/>
-          </a:fontRef>
-        </p:style>
-      </p:cxnSp>
-      <p:sp>
-        <p:nvSpPr>
-          <p:cNvPr id="48" name="TextBox 47">
-            <a:extLst>
-              <a:ext uri="{FF2B5EF4-FFF2-40B4-BE49-F238E27FC236}">
-                <a16:creationId xmlns:a16="http://schemas.microsoft.com/office/drawing/2014/main" id="{48F09FC6-5B6D-5948-B4F7-9647772CD851}"/>
-              </a:ext>
-            </a:extLst>
-          </p:cNvPr>
-          <p:cNvSpPr txBox="1"/>
-          <p:nvPr/>
-        </p:nvSpPr>
-        <p:spPr>
-          <a:xfrm>
-            <a:off x="1992856" y="89284"/>
-            <a:ext cx="3468971" cy="400110"/>
-          </a:xfrm>
-          <a:prstGeom prst="rect">
-            <a:avLst/>
-          </a:prstGeom>
-          <a:noFill/>
-        </p:spPr>
-        <p:txBody>
-          <a:bodyPr wrap="square" rtlCol="0">
-            <a:spAutoFit/>
-          </a:bodyPr>
-          <a:lstStyle/>
-          <a:p>
-            <a:r>
-              <a:rPr lang="en-CH" sz="2000" b="1" dirty="0"/>
-              <a:t>initializeInputs(scope)</a:t>
-            </a:r>
-          </a:p>
-        </p:txBody>
-      </p:sp>
-      <p:cxnSp>
-        <p:nvCxnSpPr>
-          <p:cNvPr id="51" name="Straight Arrow Connector 50">
-            <a:extLst>
-              <a:ext uri="{FF2B5EF4-FFF2-40B4-BE49-F238E27FC236}">
-                <a16:creationId xmlns:a16="http://schemas.microsoft.com/office/drawing/2014/main" id="{0D9864C2-484E-ED47-95E4-8B3BDE0474FB}"/>
-              </a:ext>
-            </a:extLst>
-          </p:cNvPr>
-          <p:cNvCxnSpPr>
-            <a:cxnSpLocks/>
-          </p:cNvCxnSpPr>
-          <p:nvPr/>
-        </p:nvCxnSpPr>
-        <p:spPr>
-          <a:xfrm>
-            <a:off x="1501895" y="289339"/>
-            <a:ext cx="490961" cy="0"/>
-          </a:xfrm>
-          <a:prstGeom prst="straightConnector1">
-            <a:avLst/>
-          </a:prstGeom>
-          <a:ln>
+          <a:ln w="38100">
             <a:solidFill>
               <a:schemeClr val="tx1"/>
             </a:solidFill>
@@ -4704,31 +5486,27 @@
       </p:cxnSp>
       <p:cxnSp>
         <p:nvCxnSpPr>
-          <p:cNvPr id="53" name="Curved Connector 52">
+          <p:cNvPr id="93" name="Straight Arrow Connector 92">
             <a:extLst>
               <a:ext uri="{FF2B5EF4-FFF2-40B4-BE49-F238E27FC236}">
-                <a16:creationId xmlns:a16="http://schemas.microsoft.com/office/drawing/2014/main" id="{3990ACE8-0ADB-8F4E-B9F2-1B05CAD66200}"/>
+                <a16:creationId xmlns:a16="http://schemas.microsoft.com/office/drawing/2014/main" id="{57AFDABD-D6FE-9647-AB80-E8D723A1F0D3}"/>
               </a:ext>
             </a:extLst>
           </p:cNvPr>
           <p:cNvCxnSpPr>
             <a:cxnSpLocks/>
-            <a:stCxn id="10" idx="0"/>
-            <a:endCxn id="48" idx="2"/>
           </p:cNvCxnSpPr>
           <p:nvPr/>
         </p:nvCxnSpPr>
         <p:spPr>
-          <a:xfrm rot="5400000" flipH="1" flipV="1">
-            <a:off x="3220567" y="698505"/>
-            <a:ext cx="715886" cy="297664"/>
-          </a:xfrm>
-          <a:prstGeom prst="curvedConnector3">
-            <a:avLst>
-              <a:gd name="adj1" fmla="val 50000"/>
-            </a:avLst>
-          </a:prstGeom>
-          <a:ln>
+          <a:xfrm>
+            <a:off x="3446262" y="8913066"/>
+            <a:ext cx="0" cy="749895"/>
+          </a:xfrm>
+          <a:prstGeom prst="straightConnector1">
+            <a:avLst/>
+          </a:prstGeom>
+          <a:ln w="38100">
             <a:solidFill>
               <a:schemeClr val="tx1"/>
             </a:solidFill>
@@ -4752,45 +5530,48 @@
       </p:cxnSp>
       <p:sp>
         <p:nvSpPr>
-          <p:cNvPr id="58" name="TextBox 57">
+          <p:cNvPr id="94" name="Rectangle 93">
             <a:extLst>
               <a:ext uri="{FF2B5EF4-FFF2-40B4-BE49-F238E27FC236}">
-                <a16:creationId xmlns:a16="http://schemas.microsoft.com/office/drawing/2014/main" id="{BF205F3D-38AC-1D45-BCBB-217A7490465B}"/>
+                <a16:creationId xmlns:a16="http://schemas.microsoft.com/office/drawing/2014/main" id="{AE5F227C-D78A-DE4A-BE0B-582A316CFFB9}"/>
               </a:ext>
             </a:extLst>
           </p:cNvPr>
-          <p:cNvSpPr txBox="1"/>
+          <p:cNvSpPr/>
           <p:nvPr/>
         </p:nvSpPr>
         <p:spPr>
           <a:xfrm>
-            <a:off x="2015591" y="666631"/>
-            <a:ext cx="1563022" cy="369332"/>
+            <a:off x="3936971" y="5245108"/>
+            <a:ext cx="1365117" cy="369332"/>
           </a:xfrm>
           <a:prstGeom prst="rect">
             <a:avLst/>
           </a:prstGeom>
-          <a:noFill/>
-        </p:spPr>
-        <p:txBody>
-          <a:bodyPr wrap="square" rtlCol="0">
+        </p:spPr>
+        <p:txBody>
+          <a:bodyPr wrap="none">
             <a:spAutoFit/>
           </a:bodyPr>
           <a:lstStyle/>
           <a:p>
             <a:r>
-              <a:rPr lang="en-CH" b="1" dirty="0"/>
-              <a:t>getBindings()</a:t>
+              <a:rPr lang="en-CH" b="1" dirty="0">
+                <a:solidFill>
+                  <a:srgbClr val="0070C0"/>
+                </a:solidFill>
+              </a:rPr>
+              <a:t>shiny:bound</a:t>
             </a:r>
           </a:p>
         </p:txBody>
       </p:sp>
       <p:cxnSp>
         <p:nvCxnSpPr>
-          <p:cNvPr id="59" name="Straight Arrow Connector 58">
+          <p:cNvPr id="97" name="Straight Arrow Connector 96">
             <a:extLst>
               <a:ext uri="{FF2B5EF4-FFF2-40B4-BE49-F238E27FC236}">
-                <a16:creationId xmlns:a16="http://schemas.microsoft.com/office/drawing/2014/main" id="{7D7F79D1-0572-954C-BBC2-B0E76787D0DF}"/>
+                <a16:creationId xmlns:a16="http://schemas.microsoft.com/office/drawing/2014/main" id="{2A380ED2-CF9D-4449-86C3-026ECD493F72}"/>
               </a:ext>
             </a:extLst>
           </p:cNvPr>
@@ -4800,14 +5581,14 @@
           <p:nvPr/>
         </p:nvCxnSpPr>
         <p:spPr>
-          <a:xfrm>
-            <a:off x="4526378" y="289339"/>
-            <a:ext cx="490961" cy="0"/>
+          <a:xfrm flipV="1">
+            <a:off x="3787737" y="4157330"/>
+            <a:ext cx="645478" cy="6498"/>
           </a:xfrm>
           <a:prstGeom prst="straightConnector1">
             <a:avLst/>
           </a:prstGeom>
-          <a:ln>
+          <a:ln w="38100">
             <a:solidFill>
               <a:schemeClr val="tx1"/>
             </a:solidFill>
@@ -4831,10 +5612,10 @@
       </p:cxnSp>
       <p:sp>
         <p:nvSpPr>
-          <p:cNvPr id="60" name="TextBox 59">
+          <p:cNvPr id="98" name="TextBox 97">
             <a:extLst>
               <a:ext uri="{FF2B5EF4-FFF2-40B4-BE49-F238E27FC236}">
-                <a16:creationId xmlns:a16="http://schemas.microsoft.com/office/drawing/2014/main" id="{074C6C6C-C43D-9B4E-B0BE-ED1B1C6F3FEE}"/>
+                <a16:creationId xmlns:a16="http://schemas.microsoft.com/office/drawing/2014/main" id="{4D740A1B-B270-A545-A3F0-BF6A434E162F}"/>
               </a:ext>
             </a:extLst>
           </p:cNvPr>
@@ -4843,8 +5624,8 @@
         </p:nvSpPr>
         <p:spPr>
           <a:xfrm>
-            <a:off x="5060646" y="89284"/>
-            <a:ext cx="1994997" cy="369332"/>
+            <a:off x="3890523" y="4208000"/>
+            <a:ext cx="620917" cy="400110"/>
           </a:xfrm>
           <a:prstGeom prst="rect">
             <a:avLst/>
@@ -4858,166 +5639,35 @@
           <a:lstStyle/>
           <a:p>
             <a:r>
-              <a:rPr lang="de-CH" dirty="0"/>
-              <a:t>Trigger </a:t>
-            </a:r>
-            <a:r>
-              <a:rPr lang="de-CH" b="1" dirty="0" err="1"/>
-              <a:t>initialize</a:t>
-            </a:r>
-            <a:endParaRPr lang="en-CH" b="1" dirty="0"/>
-          </a:p>
-        </p:txBody>
-      </p:sp>
-      <p:sp>
-        <p:nvSpPr>
-          <p:cNvPr id="61" name="TextBox 60">
+              <a:rPr lang="en-CH" sz="2000" b="1" dirty="0"/>
+              <a:t>(5)</a:t>
+            </a:r>
+          </a:p>
+        </p:txBody>
+      </p:sp>
+      <p:cxnSp>
+        <p:nvCxnSpPr>
+          <p:cNvPr id="99" name="Straight Arrow Connector 98">
             <a:extLst>
               <a:ext uri="{FF2B5EF4-FFF2-40B4-BE49-F238E27FC236}">
-                <a16:creationId xmlns:a16="http://schemas.microsoft.com/office/drawing/2014/main" id="{C5672F53-E019-1443-A99F-8750F23DE51D}"/>
+                <a16:creationId xmlns:a16="http://schemas.microsoft.com/office/drawing/2014/main" id="{EB19FB31-C461-5945-BDCB-84D4EE5F3C97}"/>
               </a:ext>
             </a:extLst>
           </p:cNvPr>
-          <p:cNvSpPr txBox="1"/>
-          <p:nvPr/>
-        </p:nvSpPr>
-        <p:spPr>
-          <a:xfrm>
-            <a:off x="4026090" y="1707965"/>
-            <a:ext cx="991249" cy="646331"/>
-          </a:xfrm>
-          <a:prstGeom prst="rect">
-            <a:avLst/>
-          </a:prstGeom>
-          <a:noFill/>
-        </p:spPr>
-        <p:txBody>
-          <a:bodyPr wrap="square" rtlCol="0">
-            <a:spAutoFit/>
-          </a:bodyPr>
-          <a:lstStyle/>
-          <a:p>
-            <a:r>
-              <a:rPr lang="en-GB" dirty="0"/>
-              <a:t>B</a:t>
-            </a:r>
-            <a:r>
-              <a:rPr lang="en-CH" dirty="0"/>
-              <a:t>indings registry</a:t>
-            </a:r>
-          </a:p>
-        </p:txBody>
-      </p:sp>
-      <p:sp>
-        <p:nvSpPr>
-          <p:cNvPr id="62" name="Rectangle 61">
-            <a:extLst>
-              <a:ext uri="{FF2B5EF4-FFF2-40B4-BE49-F238E27FC236}">
-                <a16:creationId xmlns:a16="http://schemas.microsoft.com/office/drawing/2014/main" id="{A028C3D3-9A6F-FD48-8A65-8C31480CD7E1}"/>
-              </a:ext>
-            </a:extLst>
-          </p:cNvPr>
-          <p:cNvSpPr/>
-          <p:nvPr/>
-        </p:nvSpPr>
-        <p:spPr>
-          <a:xfrm>
-            <a:off x="2973796" y="4638832"/>
-            <a:ext cx="846161" cy="341194"/>
-          </a:xfrm>
-          <a:prstGeom prst="rect">
-            <a:avLst/>
-          </a:prstGeom>
-          <a:solidFill>
-            <a:schemeClr val="tx1">
-              <a:alpha val="56000"/>
-            </a:schemeClr>
-          </a:solidFill>
-          <a:ln>
-            <a:noFill/>
-          </a:ln>
-        </p:spPr>
-        <p:style>
-          <a:lnRef idx="2">
-            <a:schemeClr val="accent1">
-              <a:shade val="50000"/>
-            </a:schemeClr>
-          </a:lnRef>
-          <a:fillRef idx="1">
-            <a:schemeClr val="accent1"/>
-          </a:fillRef>
-          <a:effectRef idx="0">
-            <a:schemeClr val="accent1"/>
-          </a:effectRef>
-          <a:fontRef idx="minor">
-            <a:schemeClr val="lt1"/>
-          </a:fontRef>
-        </p:style>
-        <p:txBody>
-          <a:bodyPr rtlCol="0" anchor="ctr"/>
-          <a:lstStyle/>
-          <a:p>
-            <a:pPr algn="ctr"/>
-            <a:endParaRPr lang="en-CH"/>
-          </a:p>
-        </p:txBody>
-      </p:sp>
-      <p:sp>
-        <p:nvSpPr>
-          <p:cNvPr id="66" name="TextBox 65">
-            <a:extLst>
-              <a:ext uri="{FF2B5EF4-FFF2-40B4-BE49-F238E27FC236}">
-                <a16:creationId xmlns:a16="http://schemas.microsoft.com/office/drawing/2014/main" id="{01F80229-B999-6842-B8A0-23A9C28CB972}"/>
-              </a:ext>
-            </a:extLst>
-          </p:cNvPr>
-          <p:cNvSpPr txBox="1"/>
-          <p:nvPr/>
-        </p:nvSpPr>
-        <p:spPr>
-          <a:xfrm>
-            <a:off x="3279465" y="8410603"/>
-            <a:ext cx="1781181" cy="369332"/>
-          </a:xfrm>
-          <a:prstGeom prst="rect">
-            <a:avLst/>
-          </a:prstGeom>
-          <a:noFill/>
-        </p:spPr>
-        <p:txBody>
-          <a:bodyPr wrap="square" rtlCol="0">
-            <a:spAutoFit/>
-          </a:bodyPr>
-          <a:lstStyle/>
-          <a:p>
-            <a:r>
-              <a:rPr lang="en-CH" dirty="0"/>
-              <a:t>initialValues</a:t>
-            </a:r>
-          </a:p>
-        </p:txBody>
-      </p:sp>
-      <p:cxnSp>
-        <p:nvCxnSpPr>
-          <p:cNvPr id="68" name="Straight Arrow Connector 67">
-            <a:extLst>
-              <a:ext uri="{FF2B5EF4-FFF2-40B4-BE49-F238E27FC236}">
-                <a16:creationId xmlns:a16="http://schemas.microsoft.com/office/drawing/2014/main" id="{632423D5-A01B-B04C-9E2D-F5A62F46E487}"/>
-              </a:ext>
-            </a:extLst>
-          </p:cNvPr>
-          <p:cNvCxnSpPr/>
+          <p:cNvCxnSpPr>
+            <a:cxnSpLocks/>
+          </p:cNvCxnSpPr>
           <p:nvPr/>
         </p:nvCxnSpPr>
         <p:spPr>
-          <a:xfrm>
-            <a:off x="3854946" y="7680869"/>
-            <a:ext cx="0" cy="740561"/>
+          <a:xfrm flipV="1">
+            <a:off x="5279546" y="4157330"/>
+            <a:ext cx="645478" cy="6498"/>
           </a:xfrm>
           <a:prstGeom prst="straightConnector1">
             <a:avLst/>
           </a:prstGeom>
-          <a:ln>
+          <a:ln w="38100">
             <a:solidFill>
               <a:schemeClr val="tx1"/>
             </a:solidFill>
@@ -5041,10 +5691,48 @@
       </p:cxnSp>
       <p:sp>
         <p:nvSpPr>
-          <p:cNvPr id="69" name="TextBox 68">
+          <p:cNvPr id="100" name="Rectangle 99">
             <a:extLst>
               <a:ext uri="{FF2B5EF4-FFF2-40B4-BE49-F238E27FC236}">
-                <a16:creationId xmlns:a16="http://schemas.microsoft.com/office/drawing/2014/main" id="{4E43D6E2-71A4-714B-AF96-140A51D76996}"/>
+                <a16:creationId xmlns:a16="http://schemas.microsoft.com/office/drawing/2014/main" id="{AEE44D72-4053-0349-9435-7C35387D37B7}"/>
+              </a:ext>
+            </a:extLst>
+          </p:cNvPr>
+          <p:cNvSpPr/>
+          <p:nvPr/>
+        </p:nvSpPr>
+        <p:spPr>
+          <a:xfrm>
+            <a:off x="5891355" y="3715260"/>
+            <a:ext cx="1058413" cy="923330"/>
+          </a:xfrm>
+          <a:prstGeom prst="rect">
+            <a:avLst/>
+          </a:prstGeom>
+        </p:spPr>
+        <p:txBody>
+          <a:bodyPr wrap="square">
+            <a:spAutoFit/>
+          </a:bodyPr>
+          <a:lstStyle/>
+          <a:p>
+            <a:r>
+              <a:rPr lang="en-CH" dirty="0"/>
+              <a:t>Apply </a:t>
+            </a:r>
+            <a:r>
+              <a:rPr lang="en-CH" b="1" dirty="0"/>
+              <a:t>rate policies</a:t>
+            </a:r>
+          </a:p>
+        </p:txBody>
+      </p:sp>
+      <p:sp>
+        <p:nvSpPr>
+          <p:cNvPr id="103" name="TextBox 102">
+            <a:extLst>
+              <a:ext uri="{FF2B5EF4-FFF2-40B4-BE49-F238E27FC236}">
+                <a16:creationId xmlns:a16="http://schemas.microsoft.com/office/drawing/2014/main" id="{9E6B4AD1-6C1B-534E-8FD2-1B38E152CD2B}"/>
               </a:ext>
             </a:extLst>
           </p:cNvPr>
@@ -5053,8 +5741,8 @@
         </p:nvSpPr>
         <p:spPr>
           <a:xfrm>
-            <a:off x="3244575" y="7311537"/>
-            <a:ext cx="1781181" cy="369332"/>
+            <a:off x="5302943" y="4176340"/>
+            <a:ext cx="620917" cy="400110"/>
           </a:xfrm>
           <a:prstGeom prst="rect">
             <a:avLst/>
@@ -5068,67 +5756,193 @@
           <a:lstStyle/>
           <a:p>
             <a:r>
-              <a:rPr lang="en-GB" dirty="0"/>
-              <a:t>C</a:t>
-            </a:r>
-            <a:r>
-              <a:rPr lang="en-CH" dirty="0"/>
-              <a:t>lient data</a:t>
-            </a:r>
-          </a:p>
-        </p:txBody>
-      </p:sp>
-      <p:cxnSp>
-        <p:nvCxnSpPr>
-          <p:cNvPr id="70" name="Straight Arrow Connector 69">
+              <a:rPr lang="en-CH" sz="2000" b="1" dirty="0"/>
+              <a:t>(6)</a:t>
+            </a:r>
+          </a:p>
+        </p:txBody>
+      </p:sp>
+      <p:sp>
+        <p:nvSpPr>
+          <p:cNvPr id="104" name="TextBox 103">
             <a:extLst>
               <a:ext uri="{FF2B5EF4-FFF2-40B4-BE49-F238E27FC236}">
-                <a16:creationId xmlns:a16="http://schemas.microsoft.com/office/drawing/2014/main" id="{B4AF7AC7-9911-1E44-B77D-4DBE4F11F919}"/>
+                <a16:creationId xmlns:a16="http://schemas.microsoft.com/office/drawing/2014/main" id="{EB519C61-2612-A34C-A366-572B88C607E4}"/>
               </a:ext>
             </a:extLst>
           </p:cNvPr>
-          <p:cNvCxnSpPr>
-            <a:cxnSpLocks/>
-            <a:endCxn id="66" idx="1"/>
-          </p:cNvCxnSpPr>
+          <p:cNvSpPr txBox="1"/>
           <p:nvPr/>
-        </p:nvCxnSpPr>
-        <p:spPr>
-          <a:xfrm flipV="1">
-            <a:off x="2594169" y="8595269"/>
-            <a:ext cx="685296" cy="541626"/>
-          </a:xfrm>
-          <a:prstGeom prst="straightConnector1">
-            <a:avLst/>
-          </a:prstGeom>
-          <a:ln>
-            <a:solidFill>
-              <a:schemeClr val="tx1"/>
-            </a:solidFill>
-            <a:tailEnd type="triangle"/>
-          </a:ln>
-        </p:spPr>
-        <p:style>
-          <a:lnRef idx="1">
-            <a:schemeClr val="accent1"/>
-          </a:lnRef>
-          <a:fillRef idx="0">
-            <a:schemeClr val="accent1"/>
-          </a:fillRef>
-          <a:effectRef idx="0">
-            <a:schemeClr val="accent1"/>
-          </a:effectRef>
-          <a:fontRef idx="minor">
-            <a:schemeClr val="tx1"/>
-          </a:fontRef>
-        </p:style>
-      </p:cxnSp>
-      <p:sp>
-        <p:nvSpPr>
-          <p:cNvPr id="73" name="Rectangle 72">
+        </p:nvSpPr>
+        <p:spPr>
+          <a:xfrm>
+            <a:off x="4695826" y="5457453"/>
+            <a:ext cx="620917" cy="400110"/>
+          </a:xfrm>
+          <a:prstGeom prst="rect">
+            <a:avLst/>
+          </a:prstGeom>
+          <a:noFill/>
+        </p:spPr>
+        <p:txBody>
+          <a:bodyPr wrap="square" rtlCol="0">
+            <a:spAutoFit/>
+          </a:bodyPr>
+          <a:lstStyle/>
+          <a:p>
+            <a:r>
+              <a:rPr lang="en-CH" sz="2000" b="1" dirty="0"/>
+              <a:t>(7)</a:t>
+            </a:r>
+          </a:p>
+        </p:txBody>
+      </p:sp>
+      <p:sp>
+        <p:nvSpPr>
+          <p:cNvPr id="105" name="TextBox 104">
             <a:extLst>
               <a:ext uri="{FF2B5EF4-FFF2-40B4-BE49-F238E27FC236}">
-                <a16:creationId xmlns:a16="http://schemas.microsoft.com/office/drawing/2014/main" id="{A754E506-0FFD-9348-8FB9-F99BF4896781}"/>
+                <a16:creationId xmlns:a16="http://schemas.microsoft.com/office/drawing/2014/main" id="{8266E8EA-64B9-9F46-918C-3034F04849A2}"/>
+              </a:ext>
+            </a:extLst>
+          </p:cNvPr>
+          <p:cNvSpPr txBox="1"/>
+          <p:nvPr/>
+        </p:nvSpPr>
+        <p:spPr>
+          <a:xfrm>
+            <a:off x="2823136" y="5199642"/>
+            <a:ext cx="620917" cy="400110"/>
+          </a:xfrm>
+          <a:prstGeom prst="rect">
+            <a:avLst/>
+          </a:prstGeom>
+          <a:noFill/>
+        </p:spPr>
+        <p:txBody>
+          <a:bodyPr wrap="square" rtlCol="0">
+            <a:spAutoFit/>
+          </a:bodyPr>
+          <a:lstStyle/>
+          <a:p>
+            <a:r>
+              <a:rPr lang="en-CH" sz="2000" b="1" dirty="0"/>
+              <a:t>(8)</a:t>
+            </a:r>
+          </a:p>
+        </p:txBody>
+      </p:sp>
+      <p:sp>
+        <p:nvSpPr>
+          <p:cNvPr id="106" name="TextBox 105">
+            <a:extLst>
+              <a:ext uri="{FF2B5EF4-FFF2-40B4-BE49-F238E27FC236}">
+                <a16:creationId xmlns:a16="http://schemas.microsoft.com/office/drawing/2014/main" id="{76CB1E57-4F28-004C-86E9-3FEC3C697EF2}"/>
+              </a:ext>
+            </a:extLst>
+          </p:cNvPr>
+          <p:cNvSpPr txBox="1"/>
+          <p:nvPr/>
+        </p:nvSpPr>
+        <p:spPr>
+          <a:xfrm>
+            <a:off x="2823324" y="6200897"/>
+            <a:ext cx="620917" cy="400110"/>
+          </a:xfrm>
+          <a:prstGeom prst="rect">
+            <a:avLst/>
+          </a:prstGeom>
+          <a:noFill/>
+        </p:spPr>
+        <p:txBody>
+          <a:bodyPr wrap="square" rtlCol="0">
+            <a:spAutoFit/>
+          </a:bodyPr>
+          <a:lstStyle/>
+          <a:p>
+            <a:r>
+              <a:rPr lang="en-CH" sz="2000" b="1" dirty="0"/>
+              <a:t>(9)</a:t>
+            </a:r>
+          </a:p>
+        </p:txBody>
+      </p:sp>
+      <p:sp>
+        <p:nvSpPr>
+          <p:cNvPr id="107" name="TextBox 106">
+            <a:extLst>
+              <a:ext uri="{FF2B5EF4-FFF2-40B4-BE49-F238E27FC236}">
+                <a16:creationId xmlns:a16="http://schemas.microsoft.com/office/drawing/2014/main" id="{AC69277A-D4C3-0F43-810A-7C2A44DA32F5}"/>
+              </a:ext>
+            </a:extLst>
+          </p:cNvPr>
+          <p:cNvSpPr txBox="1"/>
+          <p:nvPr/>
+        </p:nvSpPr>
+        <p:spPr>
+          <a:xfrm>
+            <a:off x="2823136" y="7221670"/>
+            <a:ext cx="620917" cy="400110"/>
+          </a:xfrm>
+          <a:prstGeom prst="rect">
+            <a:avLst/>
+          </a:prstGeom>
+          <a:noFill/>
+        </p:spPr>
+        <p:txBody>
+          <a:bodyPr wrap="square" rtlCol="0">
+            <a:spAutoFit/>
+          </a:bodyPr>
+          <a:lstStyle/>
+          <a:p>
+            <a:r>
+              <a:rPr lang="en-CH" sz="2000" b="1" dirty="0"/>
+              <a:t>(10)</a:t>
+            </a:r>
+          </a:p>
+        </p:txBody>
+      </p:sp>
+      <p:sp>
+        <p:nvSpPr>
+          <p:cNvPr id="108" name="TextBox 107">
+            <a:extLst>
+              <a:ext uri="{FF2B5EF4-FFF2-40B4-BE49-F238E27FC236}">
+                <a16:creationId xmlns:a16="http://schemas.microsoft.com/office/drawing/2014/main" id="{D9C0BA63-67A8-9347-8C60-57E673CD0CAD}"/>
+              </a:ext>
+            </a:extLst>
+          </p:cNvPr>
+          <p:cNvSpPr txBox="1"/>
+          <p:nvPr/>
+        </p:nvSpPr>
+        <p:spPr>
+          <a:xfrm>
+            <a:off x="2827025" y="9095679"/>
+            <a:ext cx="620917" cy="400110"/>
+          </a:xfrm>
+          <a:prstGeom prst="rect">
+            <a:avLst/>
+          </a:prstGeom>
+          <a:noFill/>
+        </p:spPr>
+        <p:txBody>
+          <a:bodyPr wrap="square" rtlCol="0">
+            <a:spAutoFit/>
+          </a:bodyPr>
+          <a:lstStyle/>
+          <a:p>
+            <a:r>
+              <a:rPr lang="en-CH" sz="2000" b="1" dirty="0"/>
+              <a:t>(11)</a:t>
+            </a:r>
+          </a:p>
+        </p:txBody>
+      </p:sp>
+      <p:sp>
+        <p:nvSpPr>
+          <p:cNvPr id="112" name="Rectangle 111">
+            <a:extLst>
+              <a:ext uri="{FF2B5EF4-FFF2-40B4-BE49-F238E27FC236}">
+                <a16:creationId xmlns:a16="http://schemas.microsoft.com/office/drawing/2014/main" id="{C854F210-6770-454F-B431-6D2CF5CC25B7}"/>
               </a:ext>
             </a:extLst>
           </p:cNvPr>
@@ -5137,479 +5951,22 @@
         </p:nvSpPr>
         <p:spPr>
           <a:xfrm>
-            <a:off x="138752" y="5351241"/>
-            <a:ext cx="2350326" cy="3441095"/>
+            <a:off x="4437320" y="3686120"/>
+            <a:ext cx="1150804" cy="1200329"/>
           </a:xfrm>
           <a:prstGeom prst="rect">
             <a:avLst/>
           </a:prstGeom>
-          <a:noFill/>
-          <a:ln w="38100">
-            <a:solidFill>
-              <a:schemeClr val="tx1"/>
-            </a:solidFill>
-          </a:ln>
-        </p:spPr>
-        <p:style>
-          <a:lnRef idx="2">
-            <a:schemeClr val="accent1">
-              <a:shade val="50000"/>
-            </a:schemeClr>
-          </a:lnRef>
-          <a:fillRef idx="1">
-            <a:schemeClr val="accent1"/>
-          </a:fillRef>
-          <a:effectRef idx="0">
-            <a:schemeClr val="accent1"/>
-          </a:effectRef>
-          <a:fontRef idx="minor">
-            <a:schemeClr val="lt1"/>
-          </a:fontRef>
-        </p:style>
-        <p:txBody>
-          <a:bodyPr rtlCol="0" anchor="ctr"/>
-          <a:lstStyle/>
-          <a:p>
-            <a:pPr algn="ctr"/>
-            <a:endParaRPr lang="en-CH"/>
-          </a:p>
-        </p:txBody>
-      </p:sp>
-      <p:cxnSp>
-        <p:nvCxnSpPr>
-          <p:cNvPr id="74" name="Straight Arrow Connector 73">
-            <a:extLst>
-              <a:ext uri="{FF2B5EF4-FFF2-40B4-BE49-F238E27FC236}">
-                <a16:creationId xmlns:a16="http://schemas.microsoft.com/office/drawing/2014/main" id="{1339AA53-A069-844D-87BC-D4726FBF181E}"/>
-              </a:ext>
-            </a:extLst>
-          </p:cNvPr>
-          <p:cNvCxnSpPr>
-            <a:cxnSpLocks/>
-          </p:cNvCxnSpPr>
-          <p:nvPr/>
-        </p:nvCxnSpPr>
-        <p:spPr>
-          <a:xfrm>
-            <a:off x="4534924" y="8633624"/>
-            <a:ext cx="482415" cy="0"/>
-          </a:xfrm>
-          <a:prstGeom prst="straightConnector1">
-            <a:avLst/>
-          </a:prstGeom>
-          <a:ln>
-            <a:solidFill>
-              <a:schemeClr val="tx1"/>
-            </a:solidFill>
-            <a:tailEnd type="triangle"/>
-          </a:ln>
-        </p:spPr>
-        <p:style>
-          <a:lnRef idx="1">
-            <a:schemeClr val="accent1"/>
-          </a:lnRef>
-          <a:fillRef idx="0">
-            <a:schemeClr val="accent1"/>
-          </a:fillRef>
-          <a:effectRef idx="0">
-            <a:schemeClr val="accent1"/>
-          </a:effectRef>
-          <a:fontRef idx="minor">
-            <a:schemeClr val="tx1"/>
-          </a:fontRef>
-        </p:style>
-      </p:cxnSp>
-      <p:sp>
-        <p:nvSpPr>
-          <p:cNvPr id="77" name="TextBox 76">
-            <a:extLst>
-              <a:ext uri="{FF2B5EF4-FFF2-40B4-BE49-F238E27FC236}">
-                <a16:creationId xmlns:a16="http://schemas.microsoft.com/office/drawing/2014/main" id="{CEEE9991-087E-C244-952A-35DF0DC48ACC}"/>
-              </a:ext>
-            </a:extLst>
-          </p:cNvPr>
-          <p:cNvSpPr txBox="1"/>
-          <p:nvPr/>
-        </p:nvSpPr>
-        <p:spPr>
-          <a:xfrm>
-            <a:off x="5017340" y="8382138"/>
-            <a:ext cx="1781182" cy="646331"/>
-          </a:xfrm>
-          <a:prstGeom prst="rect">
-            <a:avLst/>
-          </a:prstGeom>
-          <a:noFill/>
-        </p:spPr>
-        <p:txBody>
-          <a:bodyPr wrap="square" rtlCol="0">
+        </p:spPr>
+        <p:txBody>
+          <a:bodyPr wrap="square">
             <a:spAutoFit/>
           </a:bodyPr>
           <a:lstStyle/>
           <a:p>
             <a:r>
-              <a:rPr lang="en-GB" b="1" dirty="0"/>
-              <a:t>s</a:t>
-            </a:r>
-            <a:r>
-              <a:rPr lang="en-CH" b="1" dirty="0"/>
-              <a:t>hinyapp.connect(initialValues)</a:t>
-            </a:r>
-          </a:p>
-        </p:txBody>
-      </p:sp>
-      <p:cxnSp>
-        <p:nvCxnSpPr>
-          <p:cNvPr id="79" name="Straight Arrow Connector 78">
-            <a:extLst>
-              <a:ext uri="{FF2B5EF4-FFF2-40B4-BE49-F238E27FC236}">
-                <a16:creationId xmlns:a16="http://schemas.microsoft.com/office/drawing/2014/main" id="{5CC0A045-46FB-DF4A-AAD7-D8FB2F6882B6}"/>
-              </a:ext>
-            </a:extLst>
-          </p:cNvPr>
-          <p:cNvCxnSpPr>
-            <a:cxnSpLocks/>
-          </p:cNvCxnSpPr>
-          <p:nvPr/>
-        </p:nvCxnSpPr>
-        <p:spPr>
-          <a:xfrm flipV="1">
-            <a:off x="5715496" y="7606525"/>
-            <a:ext cx="0" cy="814905"/>
-          </a:xfrm>
-          <a:prstGeom prst="straightConnector1">
-            <a:avLst/>
-          </a:prstGeom>
-          <a:ln>
-            <a:solidFill>
-              <a:schemeClr val="tx1"/>
-            </a:solidFill>
-            <a:tailEnd type="triangle"/>
-          </a:ln>
-        </p:spPr>
-        <p:style>
-          <a:lnRef idx="1">
-            <a:schemeClr val="accent1"/>
-          </a:lnRef>
-          <a:fillRef idx="0">
-            <a:schemeClr val="accent1"/>
-          </a:fillRef>
-          <a:effectRef idx="0">
-            <a:schemeClr val="accent1"/>
-          </a:effectRef>
-          <a:fontRef idx="minor">
-            <a:schemeClr val="tx1"/>
-          </a:fontRef>
-        </p:style>
-      </p:cxnSp>
-      <p:sp>
-        <p:nvSpPr>
-          <p:cNvPr id="81" name="TextBox 80">
-            <a:extLst>
-              <a:ext uri="{FF2B5EF4-FFF2-40B4-BE49-F238E27FC236}">
-                <a16:creationId xmlns:a16="http://schemas.microsoft.com/office/drawing/2014/main" id="{90B21A57-F4E2-DE4C-AC2E-2187E041601E}"/>
-              </a:ext>
-            </a:extLst>
-          </p:cNvPr>
-          <p:cNvSpPr txBox="1"/>
-          <p:nvPr/>
-        </p:nvSpPr>
-        <p:spPr>
-          <a:xfrm>
-            <a:off x="4551776" y="5422196"/>
-            <a:ext cx="2257484" cy="2062103"/>
-          </a:xfrm>
-          <a:prstGeom prst="rect">
-            <a:avLst/>
-          </a:prstGeom>
-          <a:noFill/>
-        </p:spPr>
-        <p:txBody>
-          <a:bodyPr wrap="square" rtlCol="0">
-            <a:spAutoFit/>
-          </a:bodyPr>
-          <a:lstStyle/>
-          <a:p>
-            <a:r>
-              <a:rPr lang="en-CH" sz="1600" dirty="0"/>
-              <a:t>createSocket()</a:t>
-            </a:r>
-          </a:p>
-          <a:p>
-            <a:pPr marL="285750" indent="-285750">
-              <a:buFont typeface="Arial" panose="020B0604020202020204" pitchFamily="34" charset="0"/>
-              <a:buChar char="•"/>
-            </a:pPr>
-            <a:r>
-              <a:rPr lang="en-GB" sz="1600" dirty="0"/>
-              <a:t>I</a:t>
-            </a:r>
-            <a:r>
-              <a:rPr lang="en-CH" sz="1600" dirty="0"/>
-              <a:t>nit </a:t>
-            </a:r>
-            <a:r>
-              <a:rPr lang="en-CH" sz="1600" b="1" dirty="0"/>
-              <a:t>client websocket</a:t>
-            </a:r>
-          </a:p>
-          <a:p>
-            <a:pPr marL="285750" indent="-285750">
-              <a:buFont typeface="Arial" panose="020B0604020202020204" pitchFamily="34" charset="0"/>
-              <a:buChar char="•"/>
-            </a:pPr>
-            <a:r>
-              <a:rPr lang="en-GB" sz="1600" dirty="0"/>
-              <a:t>T</a:t>
-            </a:r>
-            <a:r>
-              <a:rPr lang="en-CH" sz="1600" dirty="0"/>
-              <a:t>rigger </a:t>
-            </a:r>
-            <a:r>
-              <a:rPr lang="en-CH" sz="1600" b="1" dirty="0">
-                <a:solidFill>
-                  <a:srgbClr val="0070C0"/>
-                </a:solidFill>
-              </a:rPr>
-              <a:t>shiny:connected</a:t>
-            </a:r>
-          </a:p>
-          <a:p>
-            <a:pPr marL="285750" indent="-285750">
-              <a:buFont typeface="Arial" panose="020B0604020202020204" pitchFamily="34" charset="0"/>
-              <a:buChar char="•"/>
-            </a:pPr>
-            <a:r>
-              <a:rPr lang="en-CH" sz="1600" dirty="0"/>
-              <a:t>Remove disconnected overlay</a:t>
-            </a:r>
-          </a:p>
-          <a:p>
-            <a:pPr marL="285750" indent="-285750">
-              <a:buFont typeface="Arial" panose="020B0604020202020204" pitchFamily="34" charset="0"/>
-              <a:buChar char="•"/>
-            </a:pPr>
-            <a:r>
-              <a:rPr lang="en-CH" sz="1600" dirty="0"/>
-              <a:t>Send initialValues to the </a:t>
-            </a:r>
-            <a:r>
-              <a:rPr lang="en-CH" sz="1600" b="1" dirty="0"/>
-              <a:t>server (batch)</a:t>
-            </a:r>
-            <a:r>
-              <a:rPr lang="en-CH" sz="1600" dirty="0"/>
-              <a:t> </a:t>
-            </a:r>
-          </a:p>
-        </p:txBody>
-      </p:sp>
-      <p:cxnSp>
-        <p:nvCxnSpPr>
-          <p:cNvPr id="82" name="Straight Arrow Connector 81">
-            <a:extLst>
-              <a:ext uri="{FF2B5EF4-FFF2-40B4-BE49-F238E27FC236}">
-                <a16:creationId xmlns:a16="http://schemas.microsoft.com/office/drawing/2014/main" id="{A07D9939-5675-ED49-96C0-9AFF4D365453}"/>
-              </a:ext>
-            </a:extLst>
-          </p:cNvPr>
-          <p:cNvCxnSpPr>
-            <a:cxnSpLocks/>
-          </p:cNvCxnSpPr>
-          <p:nvPr/>
-        </p:nvCxnSpPr>
-        <p:spPr>
-          <a:xfrm flipV="1">
-            <a:off x="5786090" y="4483504"/>
-            <a:ext cx="0" cy="814905"/>
-          </a:xfrm>
-          <a:prstGeom prst="straightConnector1">
-            <a:avLst/>
-          </a:prstGeom>
-          <a:ln>
-            <a:solidFill>
-              <a:schemeClr val="tx1"/>
-            </a:solidFill>
-            <a:tailEnd type="triangle"/>
-          </a:ln>
-        </p:spPr>
-        <p:style>
-          <a:lnRef idx="1">
-            <a:schemeClr val="accent1"/>
-          </a:lnRef>
-          <a:fillRef idx="0">
-            <a:schemeClr val="accent1"/>
-          </a:fillRef>
-          <a:effectRef idx="0">
-            <a:schemeClr val="accent1"/>
-          </a:effectRef>
-          <a:fontRef idx="minor">
-            <a:schemeClr val="tx1"/>
-          </a:fontRef>
-        </p:style>
-      </p:cxnSp>
-      <p:sp>
-        <p:nvSpPr>
-          <p:cNvPr id="83" name="TextBox 82">
-            <a:extLst>
-              <a:ext uri="{FF2B5EF4-FFF2-40B4-BE49-F238E27FC236}">
-                <a16:creationId xmlns:a16="http://schemas.microsoft.com/office/drawing/2014/main" id="{640CE1D8-108E-B441-BF10-EAE2B8219470}"/>
-              </a:ext>
-            </a:extLst>
-          </p:cNvPr>
-          <p:cNvSpPr txBox="1"/>
-          <p:nvPr/>
-        </p:nvSpPr>
-        <p:spPr>
-          <a:xfrm>
-            <a:off x="4551775" y="4163537"/>
-            <a:ext cx="3010102" cy="369332"/>
-          </a:xfrm>
-          <a:prstGeom prst="rect">
-            <a:avLst/>
-          </a:prstGeom>
-          <a:noFill/>
-        </p:spPr>
-        <p:txBody>
-          <a:bodyPr wrap="square" rtlCol="0">
-            <a:spAutoFit/>
-          </a:bodyPr>
-          <a:lstStyle/>
-          <a:p>
-            <a:r>
-              <a:rPr lang="en-GB" b="1" dirty="0">
-                <a:solidFill>
-                  <a:srgbClr val="0070C0"/>
-                </a:solidFill>
-              </a:rPr>
-              <a:t>s</a:t>
-            </a:r>
-            <a:r>
-              <a:rPr lang="en-CH" b="1" dirty="0">
-                <a:solidFill>
-                  <a:srgbClr val="0070C0"/>
-                </a:solidFill>
-              </a:rPr>
-              <a:t>hiny:sessioninitialized</a:t>
-            </a:r>
-          </a:p>
-        </p:txBody>
-      </p:sp>
-      <p:cxnSp>
-        <p:nvCxnSpPr>
-          <p:cNvPr id="84" name="Straight Arrow Connector 83">
-            <a:extLst>
-              <a:ext uri="{FF2B5EF4-FFF2-40B4-BE49-F238E27FC236}">
-                <a16:creationId xmlns:a16="http://schemas.microsoft.com/office/drawing/2014/main" id="{091F11C1-29D8-6344-9B4C-33652335F917}"/>
-              </a:ext>
-            </a:extLst>
-          </p:cNvPr>
-          <p:cNvCxnSpPr>
-            <a:cxnSpLocks/>
-          </p:cNvCxnSpPr>
-          <p:nvPr/>
-        </p:nvCxnSpPr>
-        <p:spPr>
-          <a:xfrm flipH="1">
-            <a:off x="5060646" y="1946506"/>
-            <a:ext cx="654850" cy="1"/>
-          </a:xfrm>
-          <a:prstGeom prst="straightConnector1">
-            <a:avLst/>
-          </a:prstGeom>
-          <a:ln>
-            <a:solidFill>
-              <a:schemeClr val="tx1"/>
-            </a:solidFill>
-            <a:tailEnd type="triangle"/>
-          </a:ln>
-        </p:spPr>
-        <p:style>
-          <a:lnRef idx="1">
-            <a:schemeClr val="accent1"/>
-          </a:lnRef>
-          <a:fillRef idx="0">
-            <a:schemeClr val="accent1"/>
-          </a:fillRef>
-          <a:effectRef idx="0">
-            <a:schemeClr val="accent1"/>
-          </a:effectRef>
-          <a:fontRef idx="minor">
-            <a:schemeClr val="tx1"/>
-          </a:fontRef>
-        </p:style>
-      </p:cxnSp>
-      <p:sp>
-        <p:nvSpPr>
-          <p:cNvPr id="86" name="TextBox 85">
-            <a:extLst>
-              <a:ext uri="{FF2B5EF4-FFF2-40B4-BE49-F238E27FC236}">
-                <a16:creationId xmlns:a16="http://schemas.microsoft.com/office/drawing/2014/main" id="{F6F18A8B-9372-9547-B910-F7A4E0928935}"/>
-              </a:ext>
-            </a:extLst>
-          </p:cNvPr>
-          <p:cNvSpPr txBox="1"/>
-          <p:nvPr/>
-        </p:nvSpPr>
-        <p:spPr>
-          <a:xfrm>
-            <a:off x="5844775" y="1626081"/>
-            <a:ext cx="1110996" cy="923330"/>
-          </a:xfrm>
-          <a:prstGeom prst="rect">
-            <a:avLst/>
-          </a:prstGeom>
-          <a:noFill/>
-        </p:spPr>
-        <p:txBody>
-          <a:bodyPr wrap="square" rtlCol="0">
-            <a:spAutoFit/>
-          </a:bodyPr>
-          <a:lstStyle/>
-          <a:p>
-            <a:r>
-              <a:rPr lang="en-GB" dirty="0"/>
-              <a:t>U</a:t>
-            </a:r>
-            <a:r>
               <a:rPr lang="en-CH" dirty="0"/>
-              <a:t>ser defined inputs</a:t>
-            </a:r>
-          </a:p>
-        </p:txBody>
-      </p:sp>
-      <p:sp>
-        <p:nvSpPr>
-          <p:cNvPr id="87" name="TextBox 86">
-            <a:extLst>
-              <a:ext uri="{FF2B5EF4-FFF2-40B4-BE49-F238E27FC236}">
-                <a16:creationId xmlns:a16="http://schemas.microsoft.com/office/drawing/2014/main" id="{A832354E-5B1A-4646-B0FE-52EF5EA740DE}"/>
-              </a:ext>
-            </a:extLst>
-          </p:cNvPr>
-          <p:cNvSpPr txBox="1"/>
-          <p:nvPr/>
-        </p:nvSpPr>
-        <p:spPr>
-          <a:xfrm>
-            <a:off x="4945469" y="1460325"/>
-            <a:ext cx="952375" cy="369332"/>
-          </a:xfrm>
-          <a:prstGeom prst="rect">
-            <a:avLst/>
-          </a:prstGeom>
-          <a:noFill/>
-        </p:spPr>
-        <p:txBody>
-          <a:bodyPr wrap="square" rtlCol="0">
-            <a:spAutoFit/>
-          </a:bodyPr>
-          <a:lstStyle/>
-          <a:p>
-            <a:r>
-              <a:rPr lang="en-CH" b="1" dirty="0"/>
-              <a:t>register</a:t>
+              <a:t>Add binding data to DOM</a:t>
             </a:r>
           </a:p>
         </p:txBody>

</xml_diff>

<commit_message>
update events, custom handler + merge tabler intro
</commit_message>
<xml_diff>
--- a/images/survival-kit/init-shiny-recap.pptx
+++ b/images/survival-kit/init-shiny-recap.pptx
@@ -197,7 +197,7 @@
           <a:p>
             <a:fld id="{D3C91AF2-D911-2E49-A515-C1B4FD51DD3B}" type="datetimeFigureOut">
               <a:rPr lang="en-CH" smtClean="0"/>
-              <a:t>14.03.21</a:t>
+              <a:t>27.08.21</a:t>
             </a:fld>
             <a:endParaRPr lang="en-CH"/>
           </a:p>
@@ -680,7 +680,7 @@
           <a:p>
             <a:fld id="{D582C26B-9A71-0945-8231-47DC5EA78747}" type="datetimeFigureOut">
               <a:rPr lang="en-CH" smtClean="0"/>
-              <a:t>14.03.21</a:t>
+              <a:t>27.08.21</a:t>
             </a:fld>
             <a:endParaRPr lang="en-CH"/>
           </a:p>
@@ -850,7 +850,7 @@
           <a:p>
             <a:fld id="{D582C26B-9A71-0945-8231-47DC5EA78747}" type="datetimeFigureOut">
               <a:rPr lang="en-CH" smtClean="0"/>
-              <a:t>14.03.21</a:t>
+              <a:t>27.08.21</a:t>
             </a:fld>
             <a:endParaRPr lang="en-CH"/>
           </a:p>
@@ -1030,7 +1030,7 @@
           <a:p>
             <a:fld id="{D582C26B-9A71-0945-8231-47DC5EA78747}" type="datetimeFigureOut">
               <a:rPr lang="en-CH" smtClean="0"/>
-              <a:t>14.03.21</a:t>
+              <a:t>27.08.21</a:t>
             </a:fld>
             <a:endParaRPr lang="en-CH"/>
           </a:p>
@@ -1200,7 +1200,7 @@
           <a:p>
             <a:fld id="{D582C26B-9A71-0945-8231-47DC5EA78747}" type="datetimeFigureOut">
               <a:rPr lang="en-CH" smtClean="0"/>
-              <a:t>14.03.21</a:t>
+              <a:t>27.08.21</a:t>
             </a:fld>
             <a:endParaRPr lang="en-CH"/>
           </a:p>
@@ -1444,7 +1444,7 @@
           <a:p>
             <a:fld id="{D582C26B-9A71-0945-8231-47DC5EA78747}" type="datetimeFigureOut">
               <a:rPr lang="en-CH" smtClean="0"/>
-              <a:t>14.03.21</a:t>
+              <a:t>27.08.21</a:t>
             </a:fld>
             <a:endParaRPr lang="en-CH"/>
           </a:p>
@@ -1676,7 +1676,7 @@
           <a:p>
             <a:fld id="{D582C26B-9A71-0945-8231-47DC5EA78747}" type="datetimeFigureOut">
               <a:rPr lang="en-CH" smtClean="0"/>
-              <a:t>14.03.21</a:t>
+              <a:t>27.08.21</a:t>
             </a:fld>
             <a:endParaRPr lang="en-CH"/>
           </a:p>
@@ -2043,7 +2043,7 @@
           <a:p>
             <a:fld id="{D582C26B-9A71-0945-8231-47DC5EA78747}" type="datetimeFigureOut">
               <a:rPr lang="en-CH" smtClean="0"/>
-              <a:t>14.03.21</a:t>
+              <a:t>27.08.21</a:t>
             </a:fld>
             <a:endParaRPr lang="en-CH"/>
           </a:p>
@@ -2161,7 +2161,7 @@
           <a:p>
             <a:fld id="{D582C26B-9A71-0945-8231-47DC5EA78747}" type="datetimeFigureOut">
               <a:rPr lang="en-CH" smtClean="0"/>
-              <a:t>14.03.21</a:t>
+              <a:t>27.08.21</a:t>
             </a:fld>
             <a:endParaRPr lang="en-CH"/>
           </a:p>
@@ -2256,7 +2256,7 @@
           <a:p>
             <a:fld id="{D582C26B-9A71-0945-8231-47DC5EA78747}" type="datetimeFigureOut">
               <a:rPr lang="en-CH" smtClean="0"/>
-              <a:t>14.03.21</a:t>
+              <a:t>27.08.21</a:t>
             </a:fld>
             <a:endParaRPr lang="en-CH"/>
           </a:p>
@@ -2533,7 +2533,7 @@
           <a:p>
             <a:fld id="{D582C26B-9A71-0945-8231-47DC5EA78747}" type="datetimeFigureOut">
               <a:rPr lang="en-CH" smtClean="0"/>
-              <a:t>14.03.21</a:t>
+              <a:t>27.08.21</a:t>
             </a:fld>
             <a:endParaRPr lang="en-CH"/>
           </a:p>
@@ -2790,7 +2790,7 @@
           <a:p>
             <a:fld id="{D582C26B-9A71-0945-8231-47DC5EA78747}" type="datetimeFigureOut">
               <a:rPr lang="en-CH" smtClean="0"/>
-              <a:t>14.03.21</a:t>
+              <a:t>27.08.21</a:t>
             </a:fld>
             <a:endParaRPr lang="en-CH"/>
           </a:p>
@@ -3003,7 +3003,7 @@
           <a:p>
             <a:fld id="{D582C26B-9A71-0945-8231-47DC5EA78747}" type="datetimeFigureOut">
               <a:rPr lang="en-CH" smtClean="0"/>
-              <a:t>14.03.21</a:t>
+              <a:t>27.08.21</a:t>
             </a:fld>
             <a:endParaRPr lang="en-CH"/>
           </a:p>
@@ -3874,7 +3874,7 @@
         </p:nvSpPr>
         <p:spPr>
           <a:xfrm>
-            <a:off x="5015082" y="6500796"/>
+            <a:off x="5185541" y="4976754"/>
             <a:ext cx="2065183" cy="369332"/>
           </a:xfrm>
           <a:prstGeom prst="rect">
@@ -4044,8 +4044,8 @@
         </p:nvSpPr>
         <p:spPr>
           <a:xfrm>
-            <a:off x="5340395" y="5440036"/>
-            <a:ext cx="1223841" cy="1060760"/>
+            <a:off x="5184825" y="5440036"/>
+            <a:ext cx="1610957" cy="1060760"/>
           </a:xfrm>
           <a:prstGeom prst="rect">
             <a:avLst/>
@@ -4169,8 +4169,8 @@
         </p:nvCxnSpPr>
         <p:spPr>
           <a:xfrm rot="16200000" flipH="1">
-            <a:off x="4488619" y="3976339"/>
-            <a:ext cx="404078" cy="2523316"/>
+            <a:off x="4507613" y="3957345"/>
+            <a:ext cx="404078" cy="2561304"/>
           </a:xfrm>
           <a:prstGeom prst="curvedConnector3">
             <a:avLst>
@@ -4419,7 +4419,7 @@
         </p:nvSpPr>
         <p:spPr>
           <a:xfrm>
-            <a:off x="5456224" y="5580839"/>
+            <a:off x="5259790" y="5536531"/>
             <a:ext cx="846161" cy="341194"/>
           </a:xfrm>
           <a:prstGeom prst="rect">
@@ -5542,7 +5542,7 @@
         </p:nvSpPr>
         <p:spPr>
           <a:xfrm>
-            <a:off x="3936971" y="5245108"/>
+            <a:off x="3631881" y="5367248"/>
             <a:ext cx="1365117" cy="369332"/>
           </a:xfrm>
           <a:prstGeom prst="rect">
@@ -5776,7 +5776,7 @@
         </p:nvSpPr>
         <p:spPr>
           <a:xfrm>
-            <a:off x="4695826" y="5457453"/>
+            <a:off x="4711225" y="5594299"/>
             <a:ext cx="620917" cy="400110"/>
           </a:xfrm>
           <a:prstGeom prst="rect">
@@ -5967,6 +5967,237 @@
             <a:r>
               <a:rPr lang="en-CH" dirty="0"/>
               <a:t>Add binding data to DOM</a:t>
+            </a:r>
+          </a:p>
+        </p:txBody>
+      </p:sp>
+      <p:sp>
+        <p:nvSpPr>
+          <p:cNvPr id="63" name="Rectangle 62">
+            <a:extLst>
+              <a:ext uri="{FF2B5EF4-FFF2-40B4-BE49-F238E27FC236}">
+                <a16:creationId xmlns:a16="http://schemas.microsoft.com/office/drawing/2014/main" id="{78DC400E-869C-7F46-957F-23171C30C16F}"/>
+              </a:ext>
+            </a:extLst>
+          </p:cNvPr>
+          <p:cNvSpPr/>
+          <p:nvPr/>
+        </p:nvSpPr>
+        <p:spPr>
+          <a:xfrm>
+            <a:off x="5324353" y="5677334"/>
+            <a:ext cx="846161" cy="341194"/>
+          </a:xfrm>
+          <a:prstGeom prst="rect">
+            <a:avLst/>
+          </a:prstGeom>
+          <a:solidFill>
+            <a:schemeClr val="tx1">
+              <a:alpha val="56000"/>
+            </a:schemeClr>
+          </a:solidFill>
+          <a:ln>
+            <a:noFill/>
+          </a:ln>
+        </p:spPr>
+        <p:style>
+          <a:lnRef idx="2">
+            <a:schemeClr val="accent1">
+              <a:shade val="50000"/>
+            </a:schemeClr>
+          </a:lnRef>
+          <a:fillRef idx="1">
+            <a:schemeClr val="accent1"/>
+          </a:fillRef>
+          <a:effectRef idx="0">
+            <a:schemeClr val="accent1"/>
+          </a:effectRef>
+          <a:fontRef idx="minor">
+            <a:schemeClr val="lt1"/>
+          </a:fontRef>
+        </p:style>
+        <p:txBody>
+          <a:bodyPr rtlCol="0" anchor="ctr"/>
+          <a:lstStyle/>
+          <a:p>
+            <a:pPr algn="ctr"/>
+            <a:endParaRPr lang="en-CH"/>
+          </a:p>
+        </p:txBody>
+      </p:sp>
+      <p:cxnSp>
+        <p:nvCxnSpPr>
+          <p:cNvPr id="64" name="Straight Arrow Connector 63">
+            <a:extLst>
+              <a:ext uri="{FF2B5EF4-FFF2-40B4-BE49-F238E27FC236}">
+                <a16:creationId xmlns:a16="http://schemas.microsoft.com/office/drawing/2014/main" id="{82F54365-C4BF-C54C-B1CD-005889D2ECFB}"/>
+              </a:ext>
+            </a:extLst>
+          </p:cNvPr>
+          <p:cNvCxnSpPr>
+            <a:cxnSpLocks/>
+          </p:cNvCxnSpPr>
+          <p:nvPr/>
+        </p:nvCxnSpPr>
+        <p:spPr>
+          <a:xfrm flipV="1">
+            <a:off x="5988968" y="6578721"/>
+            <a:ext cx="0" cy="623534"/>
+          </a:xfrm>
+          <a:prstGeom prst="straightConnector1">
+            <a:avLst/>
+          </a:prstGeom>
+          <a:ln w="38100">
+            <a:solidFill>
+              <a:srgbClr val="FF0000"/>
+            </a:solidFill>
+            <a:tailEnd type="triangle"/>
+          </a:ln>
+        </p:spPr>
+        <p:style>
+          <a:lnRef idx="1">
+            <a:schemeClr val="accent1"/>
+          </a:lnRef>
+          <a:fillRef idx="0">
+            <a:schemeClr val="accent1"/>
+          </a:fillRef>
+          <a:effectRef idx="0">
+            <a:schemeClr val="accent1"/>
+          </a:effectRef>
+          <a:fontRef idx="minor">
+            <a:schemeClr val="tx1"/>
+          </a:fontRef>
+        </p:style>
+      </p:cxnSp>
+      <p:sp>
+        <p:nvSpPr>
+          <p:cNvPr id="5" name="Explosion 1 4">
+            <a:extLst>
+              <a:ext uri="{FF2B5EF4-FFF2-40B4-BE49-F238E27FC236}">
+                <a16:creationId xmlns:a16="http://schemas.microsoft.com/office/drawing/2014/main" id="{92000B41-2DEA-1548-9F19-1FE9D77D4941}"/>
+              </a:ext>
+            </a:extLst>
+          </p:cNvPr>
+          <p:cNvSpPr/>
+          <p:nvPr/>
+        </p:nvSpPr>
+        <p:spPr>
+          <a:xfrm>
+            <a:off x="5554728" y="5428203"/>
+            <a:ext cx="738263" cy="764637"/>
+          </a:xfrm>
+          <a:prstGeom prst="irregularSeal1">
+            <a:avLst/>
+          </a:prstGeom>
+          <a:solidFill>
+            <a:srgbClr val="FF0000"/>
+          </a:solidFill>
+          <a:ln>
+            <a:noFill/>
+          </a:ln>
+        </p:spPr>
+        <p:style>
+          <a:lnRef idx="2">
+            <a:schemeClr val="accent1">
+              <a:shade val="50000"/>
+            </a:schemeClr>
+          </a:lnRef>
+          <a:fillRef idx="1">
+            <a:schemeClr val="accent1"/>
+          </a:fillRef>
+          <a:effectRef idx="0">
+            <a:schemeClr val="accent1"/>
+          </a:effectRef>
+          <a:fontRef idx="minor">
+            <a:schemeClr val="lt1"/>
+          </a:fontRef>
+        </p:style>
+        <p:txBody>
+          <a:bodyPr rtlCol="0" anchor="ctr"/>
+          <a:lstStyle/>
+          <a:p>
+            <a:pPr algn="ctr"/>
+            <a:endParaRPr lang="en-CH"/>
+          </a:p>
+        </p:txBody>
+      </p:sp>
+      <p:sp>
+        <p:nvSpPr>
+          <p:cNvPr id="68" name="Rectangle 67">
+            <a:extLst>
+              <a:ext uri="{FF2B5EF4-FFF2-40B4-BE49-F238E27FC236}">
+                <a16:creationId xmlns:a16="http://schemas.microsoft.com/office/drawing/2014/main" id="{9A20D5A5-4F87-9846-8354-0456CB81DE4E}"/>
+              </a:ext>
+            </a:extLst>
+          </p:cNvPr>
+          <p:cNvSpPr/>
+          <p:nvPr/>
+        </p:nvSpPr>
+        <p:spPr>
+          <a:xfrm>
+            <a:off x="5246020" y="6144492"/>
+            <a:ext cx="1611980" cy="369332"/>
+          </a:xfrm>
+          <a:prstGeom prst="rect">
+            <a:avLst/>
+          </a:prstGeom>
+        </p:spPr>
+        <p:txBody>
+          <a:bodyPr wrap="none">
+            <a:spAutoFit/>
+          </a:bodyPr>
+          <a:lstStyle/>
+          <a:p>
+            <a:r>
+              <a:rPr lang="en-CH" b="1" dirty="0">
+                <a:solidFill>
+                  <a:srgbClr val="0070C0"/>
+                </a:solidFill>
+              </a:rPr>
+              <a:t>shiny:unbound</a:t>
+            </a:r>
+          </a:p>
+        </p:txBody>
+      </p:sp>
+      <p:sp>
+        <p:nvSpPr>
+          <p:cNvPr id="26" name="TextBox 25">
+            <a:extLst>
+              <a:ext uri="{FF2B5EF4-FFF2-40B4-BE49-F238E27FC236}">
+                <a16:creationId xmlns:a16="http://schemas.microsoft.com/office/drawing/2014/main" id="{405EAD6C-69B1-B041-ADBD-94CEC32638DC}"/>
+              </a:ext>
+            </a:extLst>
+          </p:cNvPr>
+          <p:cNvSpPr txBox="1"/>
+          <p:nvPr/>
+        </p:nvSpPr>
+        <p:spPr>
+          <a:xfrm>
+            <a:off x="5461195" y="7270702"/>
+            <a:ext cx="1380214" cy="646331"/>
+          </a:xfrm>
+          <a:prstGeom prst="rect">
+            <a:avLst/>
+          </a:prstGeom>
+          <a:noFill/>
+        </p:spPr>
+        <p:txBody>
+          <a:bodyPr wrap="square" rtlCol="0">
+            <a:spAutoFit/>
+          </a:bodyPr>
+          <a:lstStyle/>
+          <a:p>
+            <a:r>
+              <a:rPr lang="en-CH" dirty="0"/>
+              <a:t>User calls </a:t>
+            </a:r>
+            <a:r>
+              <a:rPr lang="en-CH" b="1" dirty="0"/>
+              <a:t>unbindAll</a:t>
+            </a:r>
+            <a:r>
+              <a:rPr lang="en-CH" dirty="0"/>
+              <a:t>()</a:t>
             </a:r>
           </a:p>
         </p:txBody>

</xml_diff>